<commit_message>
Added diagram of process.
</commit_message>
<xml_diff>
--- a/PatternRecognition/PatternRecognition.pptx
+++ b/PatternRecognition/PatternRecognition.pptx
@@ -5,23 +5,24 @@
     <p:sldMasterId id="2147483660" r:id="rId4"/>
   </p:sldMasterIdLst>
   <p:notesMasterIdLst>
-    <p:notesMasterId r:id="rId16"/>
+    <p:notesMasterId r:id="rId17"/>
   </p:notesMasterIdLst>
   <p:handoutMasterIdLst>
-    <p:handoutMasterId r:id="rId17"/>
+    <p:handoutMasterId r:id="rId18"/>
   </p:handoutMasterIdLst>
   <p:sldIdLst>
     <p:sldId id="257" r:id="rId5"/>
     <p:sldId id="258" r:id="rId6"/>
     <p:sldId id="259" r:id="rId7"/>
     <p:sldId id="260" r:id="rId8"/>
-    <p:sldId id="266" r:id="rId9"/>
-    <p:sldId id="261" r:id="rId10"/>
-    <p:sldId id="264" r:id="rId11"/>
-    <p:sldId id="265" r:id="rId12"/>
-    <p:sldId id="267" r:id="rId13"/>
-    <p:sldId id="262" r:id="rId14"/>
-    <p:sldId id="263" r:id="rId15"/>
+    <p:sldId id="269" r:id="rId9"/>
+    <p:sldId id="270" r:id="rId10"/>
+    <p:sldId id="266" r:id="rId11"/>
+    <p:sldId id="261" r:id="rId12"/>
+    <p:sldId id="264" r:id="rId13"/>
+    <p:sldId id="265" r:id="rId14"/>
+    <p:sldId id="267" r:id="rId15"/>
+    <p:sldId id="268" r:id="rId16"/>
   </p:sldIdLst>
   <p:sldSz cx="12188825" cy="6858000"/>
   <p:notesSz cx="6858000" cy="9144000"/>
@@ -1132,7 +1133,7 @@
             <a:pPr rtl="0"/>
             <a:fld id="{6BB98AFB-CB0D-4DFE-87B9-B4B0D0DE73CD}" type="slidenum">
               <a:rPr lang="es-ES" smtClean="0"/>
-              <a:t>6</a:t>
+              <a:t>8</a:t>
             </a:fld>
             <a:endParaRPr lang="es-ES" dirty="0"/>
           </a:p>
@@ -1142,176 +1143,6 @@
     <p:extLst>
       <p:ext uri="{BB962C8B-B14F-4D97-AF65-F5344CB8AC3E}">
         <p14:creationId xmlns:p14="http://schemas.microsoft.com/office/powerpoint/2010/main" val="2001119684"/>
-      </p:ext>
-    </p:extLst>
-  </p:cSld>
-  <p:clrMapOvr>
-    <a:masterClrMapping/>
-  </p:clrMapOvr>
-</p:notes>
-</file>
-
-<file path=ppt/notesSlides/notesSlide6.xml><?xml version="1.0" encoding="utf-8"?>
-<p:notes xmlns:a="http://schemas.openxmlformats.org/drawingml/2006/main" xmlns:r="http://schemas.openxmlformats.org/officeDocument/2006/relationships" xmlns:p="http://schemas.openxmlformats.org/presentationml/2006/main">
-  <p:cSld>
-    <p:spTree>
-      <p:nvGrpSpPr>
-        <p:cNvPr id="1" name=""/>
-        <p:cNvGrpSpPr/>
-        <p:nvPr/>
-      </p:nvGrpSpPr>
-      <p:grpSpPr>
-        <a:xfrm>
-          <a:off x="0" y="0"/>
-          <a:ext cx="0" cy="0"/>
-          <a:chOff x="0" y="0"/>
-          <a:chExt cx="0" cy="0"/>
-        </a:xfrm>
-      </p:grpSpPr>
-      <p:sp>
-        <p:nvSpPr>
-          <p:cNvPr id="2" name="Marcador de imagen de diapositiva 1"/>
-          <p:cNvSpPr>
-            <a:spLocks noGrp="1" noRot="1" noChangeAspect="1"/>
-          </p:cNvSpPr>
-          <p:nvPr>
-            <p:ph type="sldImg"/>
-          </p:nvPr>
-        </p:nvSpPr>
-        <p:spPr/>
-      </p:sp>
-      <p:sp>
-        <p:nvSpPr>
-          <p:cNvPr id="3" name="Marcador de notas 2"/>
-          <p:cNvSpPr>
-            <a:spLocks noGrp="1"/>
-          </p:cNvSpPr>
-          <p:nvPr>
-            <p:ph type="body" idx="1"/>
-          </p:nvPr>
-        </p:nvSpPr>
-        <p:spPr/>
-        <p:txBody>
-          <a:bodyPr/>
-          <a:lstStyle/>
-          <a:p>
-            <a:endParaRPr lang="es-ES"/>
-          </a:p>
-        </p:txBody>
-      </p:sp>
-      <p:sp>
-        <p:nvSpPr>
-          <p:cNvPr id="4" name="Marcador de número de diapositiva 3"/>
-          <p:cNvSpPr>
-            <a:spLocks noGrp="1"/>
-          </p:cNvSpPr>
-          <p:nvPr>
-            <p:ph type="sldNum" sz="quarter" idx="10"/>
-          </p:nvPr>
-        </p:nvSpPr>
-        <p:spPr/>
-        <p:txBody>
-          <a:bodyPr/>
-          <a:lstStyle/>
-          <a:p>
-            <a:pPr rtl="0"/>
-            <a:fld id="{6BB98AFB-CB0D-4DFE-87B9-B4B0D0DE73CD}" type="slidenum">
-              <a:rPr lang="es-ES" smtClean="0"/>
-              <a:t>10</a:t>
-            </a:fld>
-            <a:endParaRPr lang="es-ES" dirty="0"/>
-          </a:p>
-        </p:txBody>
-      </p:sp>
-    </p:spTree>
-    <p:extLst>
-      <p:ext uri="{BB962C8B-B14F-4D97-AF65-F5344CB8AC3E}">
-        <p14:creationId xmlns:p14="http://schemas.microsoft.com/office/powerpoint/2010/main" val="2146544694"/>
-      </p:ext>
-    </p:extLst>
-  </p:cSld>
-  <p:clrMapOvr>
-    <a:masterClrMapping/>
-  </p:clrMapOvr>
-</p:notes>
-</file>
-
-<file path=ppt/notesSlides/notesSlide7.xml><?xml version="1.0" encoding="utf-8"?>
-<p:notes xmlns:a="http://schemas.openxmlformats.org/drawingml/2006/main" xmlns:r="http://schemas.openxmlformats.org/officeDocument/2006/relationships" xmlns:p="http://schemas.openxmlformats.org/presentationml/2006/main">
-  <p:cSld>
-    <p:spTree>
-      <p:nvGrpSpPr>
-        <p:cNvPr id="1" name=""/>
-        <p:cNvGrpSpPr/>
-        <p:nvPr/>
-      </p:nvGrpSpPr>
-      <p:grpSpPr>
-        <a:xfrm>
-          <a:off x="0" y="0"/>
-          <a:ext cx="0" cy="0"/>
-          <a:chOff x="0" y="0"/>
-          <a:chExt cx="0" cy="0"/>
-        </a:xfrm>
-      </p:grpSpPr>
-      <p:sp>
-        <p:nvSpPr>
-          <p:cNvPr id="2" name="Marcador de imagen de diapositiva 1"/>
-          <p:cNvSpPr>
-            <a:spLocks noGrp="1" noRot="1" noChangeAspect="1"/>
-          </p:cNvSpPr>
-          <p:nvPr>
-            <p:ph type="sldImg"/>
-          </p:nvPr>
-        </p:nvSpPr>
-        <p:spPr/>
-      </p:sp>
-      <p:sp>
-        <p:nvSpPr>
-          <p:cNvPr id="3" name="Marcador de notas 2"/>
-          <p:cNvSpPr>
-            <a:spLocks noGrp="1"/>
-          </p:cNvSpPr>
-          <p:nvPr>
-            <p:ph type="body" idx="1"/>
-          </p:nvPr>
-        </p:nvSpPr>
-        <p:spPr/>
-        <p:txBody>
-          <a:bodyPr/>
-          <a:lstStyle/>
-          <a:p>
-            <a:endParaRPr lang="es-ES"/>
-          </a:p>
-        </p:txBody>
-      </p:sp>
-      <p:sp>
-        <p:nvSpPr>
-          <p:cNvPr id="4" name="Marcador de número de diapositiva 3"/>
-          <p:cNvSpPr>
-            <a:spLocks noGrp="1"/>
-          </p:cNvSpPr>
-          <p:nvPr>
-            <p:ph type="sldNum" sz="quarter" idx="10"/>
-          </p:nvPr>
-        </p:nvSpPr>
-        <p:spPr/>
-        <p:txBody>
-          <a:bodyPr/>
-          <a:lstStyle/>
-          <a:p>
-            <a:pPr rtl="0"/>
-            <a:fld id="{6BB98AFB-CB0D-4DFE-87B9-B4B0D0DE73CD}" type="slidenum">
-              <a:rPr lang="es-ES" smtClean="0"/>
-              <a:t>11</a:t>
-            </a:fld>
-            <a:endParaRPr lang="es-ES" dirty="0"/>
-          </a:p>
-        </p:txBody>
-      </p:sp>
-    </p:spTree>
-    <p:extLst>
-      <p:ext uri="{BB962C8B-B14F-4D97-AF65-F5344CB8AC3E}">
-        <p14:creationId xmlns:p14="http://schemas.microsoft.com/office/powerpoint/2010/main" val="2481812312"/>
       </p:ext>
     </p:extLst>
   </p:cSld>
@@ -4855,7 +4686,13 @@
       </p:grpSpPr>
       <p:sp>
         <p:nvSpPr>
-          <p:cNvPr id="2" name="Título 1"/>
+          <p:cNvPr id="2" name="Título 1">
+            <a:extLst>
+              <a:ext uri="{FF2B5EF4-FFF2-40B4-BE49-F238E27FC236}">
+                <a16:creationId xmlns:a16="http://schemas.microsoft.com/office/drawing/2014/main" id="{C6CF3F5D-49D3-4A0E-BEAB-16B350D3303F}"/>
+              </a:ext>
+            </a:extLst>
+          </p:cNvPr>
           <p:cNvSpPr>
             <a:spLocks noGrp="1"/>
           </p:cNvSpPr>
@@ -4863,60 +4700,80 @@
             <p:ph type="title"/>
           </p:nvPr>
         </p:nvSpPr>
-        <p:spPr/>
-        <p:txBody>
-          <a:bodyPr rtlCol="0"/>
+        <p:spPr>
+          <a:xfrm>
+            <a:off x="1751010" y="553871"/>
+            <a:ext cx="8686801" cy="1066800"/>
+          </a:xfrm>
+        </p:spPr>
+        <p:txBody>
+          <a:bodyPr/>
           <a:lstStyle/>
           <a:p>
-            <a:pPr rtl="0"/>
-            <a:r>
-              <a:rPr lang="es-ES" dirty="0"/>
-              <a:t>Opciones disponibles</a:t>
-            </a:r>
-          </a:p>
-        </p:txBody>
-      </p:sp>
-      <p:sp>
-        <p:nvSpPr>
-          <p:cNvPr id="3" name="Marcador de contenido 2"/>
-          <p:cNvSpPr>
-            <a:spLocks noGrp="1"/>
-          </p:cNvSpPr>
+            <a:pPr algn="ctr"/>
+            <a:r>
+              <a:rPr lang="es-PE" dirty="0" err="1"/>
+              <a:t>Rings</a:t>
+            </a:r>
+            <a:r>
+              <a:rPr lang="es-PE" dirty="0"/>
+              <a:t> </a:t>
+            </a:r>
+            <a:r>
+              <a:rPr lang="es-PE" dirty="0" err="1"/>
+              <a:t>Pattern</a:t>
+            </a:r>
+            <a:r>
+              <a:rPr lang="es-PE" dirty="0"/>
+              <a:t> </a:t>
+            </a:r>
+            <a:r>
+              <a:rPr lang="es-PE" dirty="0" err="1"/>
+              <a:t>Detected</a:t>
+            </a:r>
+            <a:endParaRPr lang="es-PE" dirty="0"/>
+          </a:p>
+        </p:txBody>
+      </p:sp>
+      <p:pic>
+        <p:nvPicPr>
+          <p:cNvPr id="5" name="Marcador de contenido 4">
+            <a:extLst>
+              <a:ext uri="{FF2B5EF4-FFF2-40B4-BE49-F238E27FC236}">
+                <a16:creationId xmlns:a16="http://schemas.microsoft.com/office/drawing/2014/main" id="{0DAFF8C7-42E8-4BFE-88C4-2518A16D7138}"/>
+              </a:ext>
+            </a:extLst>
+          </p:cNvPr>
+          <p:cNvPicPr>
+            <a:picLocks noGrp="1" noChangeAspect="1"/>
+          </p:cNvPicPr>
           <p:nvPr>
             <p:ph idx="1"/>
           </p:nvPr>
-        </p:nvSpPr>
-        <p:spPr/>
-        <p:txBody>
-          <a:bodyPr rtlCol="0"/>
-          <a:lstStyle/>
-          <a:p>
-            <a:pPr rtl="0"/>
-            <a:r>
-              <a:rPr lang="es-ES" dirty="0"/>
-              <a:t>Indique las estrategias alternativas.</a:t>
-            </a:r>
-          </a:p>
-          <a:p>
-            <a:pPr rtl="0"/>
-            <a:r>
-              <a:rPr lang="es-ES" dirty="0"/>
-              <a:t>Liste las ventajas y desventajas de cada una.</a:t>
-            </a:r>
-          </a:p>
-          <a:p>
-            <a:pPr rtl="0"/>
-            <a:r>
-              <a:rPr lang="es-ES" dirty="0"/>
-              <a:t>Indique el costo de cada opción.</a:t>
-            </a:r>
-          </a:p>
-        </p:txBody>
-      </p:sp>
+        </p:nvPicPr>
+        <p:blipFill>
+          <a:blip r:embed="rId2">
+            <a:extLst>
+              <a:ext uri="{28A0092B-C50C-407E-A947-70E740481C1C}">
+                <a14:useLocalDpi xmlns:a14="http://schemas.microsoft.com/office/drawing/2010/main" val="0"/>
+              </a:ext>
+            </a:extLst>
+          </a:blip>
+          <a:stretch>
+            <a:fillRect/>
+          </a:stretch>
+        </p:blipFill>
+        <p:spPr>
+          <a:xfrm>
+            <a:off x="2000793" y="2113129"/>
+            <a:ext cx="8187237" cy="4191000"/>
+          </a:xfrm>
+        </p:spPr>
+      </p:pic>
     </p:spTree>
     <p:extLst>
       <p:ext uri="{BB962C8B-B14F-4D97-AF65-F5344CB8AC3E}">
-        <p14:creationId xmlns:p14="http://schemas.microsoft.com/office/powerpoint/2010/main" val="1173429218"/>
+        <p14:creationId xmlns:p14="http://schemas.microsoft.com/office/powerpoint/2010/main" val="2464730877"/>
       </p:ext>
     </p:extLst>
   </p:cSld>
@@ -4957,7 +4814,13 @@
       </p:grpSpPr>
       <p:sp>
         <p:nvSpPr>
-          <p:cNvPr id="2" name="Título 1"/>
+          <p:cNvPr id="2" name="Título 1">
+            <a:extLst>
+              <a:ext uri="{FF2B5EF4-FFF2-40B4-BE49-F238E27FC236}">
+                <a16:creationId xmlns:a16="http://schemas.microsoft.com/office/drawing/2014/main" id="{977BAAD3-B068-41DE-B19B-4718F8950B3B}"/>
+              </a:ext>
+            </a:extLst>
+          </p:cNvPr>
           <p:cNvSpPr>
             <a:spLocks noGrp="1"/>
           </p:cNvSpPr>
@@ -4967,20 +4830,26 @@
         </p:nvSpPr>
         <p:spPr/>
         <p:txBody>
-          <a:bodyPr rtlCol="0"/>
+          <a:bodyPr/>
           <a:lstStyle/>
           <a:p>
-            <a:pPr rtl="0"/>
-            <a:r>
-              <a:rPr lang="es-ES" dirty="0"/>
-              <a:t>Recomendación</a:t>
-            </a:r>
-          </a:p>
-        </p:txBody>
-      </p:sp>
-      <p:sp>
-        <p:nvSpPr>
-          <p:cNvPr id="3" name="Marcador de contenido 2"/>
+            <a:r>
+              <a:rPr lang="es-PE" dirty="0" err="1"/>
+              <a:t>Bibliography</a:t>
+            </a:r>
+            <a:endParaRPr lang="es-PE" dirty="0"/>
+          </a:p>
+        </p:txBody>
+      </p:sp>
+      <p:sp>
+        <p:nvSpPr>
+          <p:cNvPr id="3" name="Marcador de contenido 2">
+            <a:extLst>
+              <a:ext uri="{FF2B5EF4-FFF2-40B4-BE49-F238E27FC236}">
+                <a16:creationId xmlns:a16="http://schemas.microsoft.com/office/drawing/2014/main" id="{756C1DE9-3397-46DC-8DD4-ACF6A015E9E0}"/>
+              </a:ext>
+            </a:extLst>
+          </p:cNvPr>
           <p:cNvSpPr>
             <a:spLocks noGrp="1"/>
           </p:cNvSpPr>
@@ -4990,34 +4859,110 @@
         </p:nvSpPr>
         <p:spPr/>
         <p:txBody>
-          <a:bodyPr rtlCol="0"/>
+          <a:bodyPr/>
           <a:lstStyle/>
           <a:p>
-            <a:pPr rtl="0"/>
-            <a:r>
-              <a:rPr lang="es-ES" dirty="0"/>
-              <a:t>Recomiende una o varias de las estrategias.</a:t>
-            </a:r>
-          </a:p>
-          <a:p>
-            <a:pPr rtl="0"/>
-            <a:r>
-              <a:rPr lang="es-ES" dirty="0"/>
-              <a:t>Resuma los resultados si el proceso se realiza como se propone.</a:t>
-            </a:r>
-          </a:p>
-          <a:p>
-            <a:pPr rtl="0"/>
-            <a:r>
-              <a:rPr lang="es-ES" dirty="0"/>
-              <a:t>Qué hacer a continuación.</a:t>
-            </a:r>
-          </a:p>
-          <a:p>
-            <a:pPr rtl="0"/>
-            <a:r>
-              <a:rPr lang="es-ES" dirty="0"/>
-              <a:t>Identifique los elementos de acción.</a:t>
+            <a:r>
+              <a:rPr lang="es-PE" dirty="0" err="1"/>
+              <a:t>Asthana</a:t>
+            </a:r>
+            <a:r>
+              <a:rPr lang="es-PE" dirty="0"/>
+              <a:t>, </a:t>
+            </a:r>
+            <a:r>
+              <a:rPr lang="es-PE" dirty="0" err="1"/>
+              <a:t>Shubham</a:t>
+            </a:r>
+            <a:r>
+              <a:rPr lang="es-PE" dirty="0"/>
+              <a:t>. (2014). </a:t>
+            </a:r>
+            <a:r>
+              <a:rPr lang="es-PE" dirty="0" err="1"/>
+              <a:t>Enhanced</a:t>
+            </a:r>
+            <a:r>
+              <a:rPr lang="es-PE" dirty="0"/>
+              <a:t> Camera </a:t>
+            </a:r>
+            <a:r>
+              <a:rPr lang="es-PE" dirty="0" err="1"/>
+              <a:t>Calibration</a:t>
+            </a:r>
+            <a:r>
+              <a:rPr lang="es-PE" dirty="0"/>
+              <a:t> </a:t>
+            </a:r>
+            <a:r>
+              <a:rPr lang="es-PE" dirty="0" err="1"/>
+              <a:t>for</a:t>
+            </a:r>
+            <a:r>
+              <a:rPr lang="es-PE" dirty="0"/>
+              <a:t> Machine </a:t>
+            </a:r>
+            <a:r>
+              <a:rPr lang="es-PE" dirty="0" err="1"/>
+              <a:t>Vision</a:t>
+            </a:r>
+            <a:r>
+              <a:rPr lang="es-PE" dirty="0"/>
+              <a:t> </a:t>
+            </a:r>
+            <a:r>
+              <a:rPr lang="es-PE" dirty="0" err="1"/>
+              <a:t>using</a:t>
+            </a:r>
+            <a:r>
+              <a:rPr lang="es-PE" dirty="0"/>
+              <a:t> </a:t>
+            </a:r>
+            <a:r>
+              <a:rPr lang="es-PE" dirty="0" err="1"/>
+              <a:t>OpenCV</a:t>
+            </a:r>
+            <a:r>
+              <a:rPr lang="es-PE" dirty="0"/>
+              <a:t>. International </a:t>
+            </a:r>
+            <a:r>
+              <a:rPr lang="es-PE" dirty="0" err="1"/>
+              <a:t>Journal</a:t>
+            </a:r>
+            <a:r>
+              <a:rPr lang="es-PE" dirty="0"/>
+              <a:t> </a:t>
+            </a:r>
+            <a:r>
+              <a:rPr lang="es-PE" dirty="0" err="1"/>
+              <a:t>of</a:t>
+            </a:r>
+            <a:r>
+              <a:rPr lang="es-PE" dirty="0"/>
+              <a:t> Artificial </a:t>
+            </a:r>
+            <a:r>
+              <a:rPr lang="es-PE" dirty="0" err="1"/>
+              <a:t>Intelligence</a:t>
+            </a:r>
+            <a:r>
+              <a:rPr lang="es-PE" dirty="0"/>
+              <a:t>. </a:t>
+            </a:r>
+            <a:r>
+              <a:rPr lang="es-PE" dirty="0" err="1"/>
+              <a:t>Volume</a:t>
+            </a:r>
+            <a:r>
+              <a:rPr lang="es-PE" dirty="0"/>
+              <a:t> 3. </a:t>
+            </a:r>
+          </a:p>
+          <a:p>
+            <a:r>
+              <a:rPr lang="es-PE" dirty="0"/>
+              <a:t>https://docs.opencv.org</a:t>
             </a:r>
           </a:p>
         </p:txBody>
@@ -5025,7 +4970,85 @@
     </p:spTree>
     <p:extLst>
       <p:ext uri="{BB962C8B-B14F-4D97-AF65-F5344CB8AC3E}">
-        <p14:creationId xmlns:p14="http://schemas.microsoft.com/office/powerpoint/2010/main" val="4259246236"/>
+        <p14:creationId xmlns:p14="http://schemas.microsoft.com/office/powerpoint/2010/main" val="4072475522"/>
+      </p:ext>
+    </p:extLst>
+  </p:cSld>
+  <p:clrMapOvr>
+    <a:masterClrMapping/>
+  </p:clrMapOvr>
+  <mc:AlternateContent xmlns:mc="http://schemas.openxmlformats.org/markup-compatibility/2006" xmlns:p14="http://schemas.microsoft.com/office/powerpoint/2010/main">
+    <mc:Choice Requires="p14">
+      <p:transition spd="med" p14:dur="700">
+        <p:fade/>
+      </p:transition>
+    </mc:Choice>
+    <mc:Fallback xmlns="">
+      <p:transition spd="med">
+        <p:fade/>
+      </p:transition>
+    </mc:Fallback>
+  </mc:AlternateContent>
+</p:sld>
+</file>
+
+<file path=ppt/slides/slide12.xml><?xml version="1.0" encoding="utf-8"?>
+<p:sld xmlns:a="http://schemas.openxmlformats.org/drawingml/2006/main" xmlns:r="http://schemas.openxmlformats.org/officeDocument/2006/relationships" xmlns:p="http://schemas.openxmlformats.org/presentationml/2006/main">
+  <p:cSld>
+    <p:spTree>
+      <p:nvGrpSpPr>
+        <p:cNvPr id="1" name=""/>
+        <p:cNvGrpSpPr/>
+        <p:nvPr/>
+      </p:nvGrpSpPr>
+      <p:grpSpPr>
+        <a:xfrm>
+          <a:off x="0" y="0"/>
+          <a:ext cx="0" cy="0"/>
+          <a:chOff x="0" y="0"/>
+          <a:chExt cx="0" cy="0"/>
+        </a:xfrm>
+      </p:grpSpPr>
+      <p:sp>
+        <p:nvSpPr>
+          <p:cNvPr id="2" name="Título 1">
+            <a:extLst>
+              <a:ext uri="{FF2B5EF4-FFF2-40B4-BE49-F238E27FC236}">
+                <a16:creationId xmlns:a16="http://schemas.microsoft.com/office/drawing/2014/main" id="{A3BEF894-0D5E-4CFE-B1C8-E0135661FD88}"/>
+              </a:ext>
+            </a:extLst>
+          </p:cNvPr>
+          <p:cNvSpPr>
+            <a:spLocks noGrp="1"/>
+          </p:cNvSpPr>
+          <p:nvPr>
+            <p:ph type="title"/>
+          </p:nvPr>
+        </p:nvSpPr>
+        <p:spPr>
+          <a:xfrm>
+            <a:off x="1751011" y="2341722"/>
+            <a:ext cx="8686801" cy="1066800"/>
+          </a:xfrm>
+        </p:spPr>
+        <p:txBody>
+          <a:bodyPr>
+            <a:normAutofit/>
+          </a:bodyPr>
+          <a:lstStyle/>
+          <a:p>
+            <a:pPr algn="ctr"/>
+            <a:r>
+              <a:rPr lang="es-PE" sz="6000" dirty="0"/>
+              <a:t>THANKS</a:t>
+            </a:r>
+          </a:p>
+        </p:txBody>
+      </p:sp>
+    </p:spTree>
+    <p:extLst>
+      <p:ext uri="{BB962C8B-B14F-4D97-AF65-F5344CB8AC3E}">
+        <p14:creationId xmlns:p14="http://schemas.microsoft.com/office/powerpoint/2010/main" val="3766604544"/>
       </p:ext>
     </p:extLst>
   </p:cSld>
@@ -5286,17 +5309,12 @@
           <a:p>
             <a:r>
               <a:rPr lang="en-US" dirty="0"/>
-              <a:t>Segregating these centers as marker or </a:t>
-            </a:r>
-            <a:r>
-              <a:rPr lang="en-US"/>
-              <a:t>non-marker points</a:t>
-            </a:r>
-            <a:r>
-              <a:rPr lang="es-ES"/>
+              <a:t>Segregating these centers as marker or non-marker points</a:t>
+            </a:r>
+            <a:r>
+              <a:rPr lang="es-ES" dirty="0"/>
               <a:t>.</a:t>
             </a:r>
-            <a:endParaRPr lang="es-ES" dirty="0"/>
           </a:p>
           <a:p>
             <a:r>
@@ -5363,49 +5381,1396 @@
             <p:ph type="title"/>
           </p:nvPr>
         </p:nvSpPr>
-        <p:spPr/>
+        <p:spPr>
+          <a:xfrm>
+            <a:off x="1065212" y="533400"/>
+            <a:ext cx="8686801" cy="757064"/>
+          </a:xfrm>
+        </p:spPr>
         <p:txBody>
           <a:bodyPr rtlCol="0"/>
           <a:lstStyle/>
           <a:p>
             <a:pPr rtl="0"/>
             <a:r>
+              <a:rPr lang="es-ES" dirty="0" err="1"/>
+              <a:t>Detection</a:t>
+            </a:r>
+            <a:r>
               <a:rPr lang="es-ES" dirty="0"/>
-              <a:t>Situación actual</a:t>
-            </a:r>
-          </a:p>
-        </p:txBody>
-      </p:sp>
-      <p:sp>
-        <p:nvSpPr>
-          <p:cNvPr id="3" name="Marcador de contenido 2"/>
-          <p:cNvSpPr>
-            <a:spLocks noGrp="1"/>
-          </p:cNvSpPr>
-          <p:nvPr>
-            <p:ph idx="1"/>
-          </p:nvPr>
-        </p:nvSpPr>
-        <p:spPr/>
-        <p:txBody>
-          <a:bodyPr rtlCol="0"/>
+              <a:t> </a:t>
+            </a:r>
+            <a:r>
+              <a:rPr lang="es-ES" dirty="0" err="1"/>
+              <a:t>of</a:t>
+            </a:r>
+            <a:r>
+              <a:rPr lang="es-ES" dirty="0"/>
+              <a:t> </a:t>
+            </a:r>
+            <a:r>
+              <a:rPr lang="es-ES" dirty="0" err="1"/>
+              <a:t>Circles</a:t>
+            </a:r>
+            <a:endParaRPr lang="es-ES" dirty="0"/>
+          </a:p>
+        </p:txBody>
+      </p:sp>
+      <p:sp>
+        <p:nvSpPr>
+          <p:cNvPr id="4" name="Rectángulo 3">
+            <a:extLst>
+              <a:ext uri="{FF2B5EF4-FFF2-40B4-BE49-F238E27FC236}">
+                <a16:creationId xmlns:a16="http://schemas.microsoft.com/office/drawing/2014/main" id="{D14F3263-59DB-442F-A5EB-66255C9F86B2}"/>
+              </a:ext>
+            </a:extLst>
+          </p:cNvPr>
+          <p:cNvSpPr/>
+          <p:nvPr/>
+        </p:nvSpPr>
+        <p:spPr>
+          <a:xfrm>
+            <a:off x="3502124" y="1624841"/>
+            <a:ext cx="2376264" cy="576064"/>
+          </a:xfrm>
+          <a:prstGeom prst="rect">
+            <a:avLst/>
+          </a:prstGeom>
+          <a:ln>
+            <a:noFill/>
+          </a:ln>
+        </p:spPr>
+        <p:style>
+          <a:lnRef idx="1">
+            <a:schemeClr val="accent2"/>
+          </a:lnRef>
+          <a:fillRef idx="2">
+            <a:schemeClr val="accent2"/>
+          </a:fillRef>
+          <a:effectRef idx="1">
+            <a:schemeClr val="accent2"/>
+          </a:effectRef>
+          <a:fontRef idx="minor">
+            <a:schemeClr val="dk1"/>
+          </a:fontRef>
+        </p:style>
+        <p:txBody>
+          <a:bodyPr rtlCol="0" anchor="ctr"/>
           <a:lstStyle/>
           <a:p>
-            <a:pPr rtl="0"/>
-            <a:r>
-              <a:rPr lang="es-ES" dirty="0"/>
-              <a:t>Resumen de la situación actual.</a:t>
-            </a:r>
-          </a:p>
-          <a:p>
-            <a:pPr rtl="0"/>
-            <a:r>
-              <a:rPr lang="es-ES" dirty="0"/>
-              <a:t>Use viñetas breves, trate verbalmente los detalles.</a:t>
-            </a:r>
-          </a:p>
-        </p:txBody>
-      </p:sp>
+            <a:pPr algn="ctr"/>
+            <a:r>
+              <a:rPr lang="es-PE" b="1" dirty="0"/>
+              <a:t>PRE-PROCESSING</a:t>
+            </a:r>
+          </a:p>
+        </p:txBody>
+      </p:sp>
+      <p:sp>
+        <p:nvSpPr>
+          <p:cNvPr id="5" name="Rectángulo 4">
+            <a:extLst>
+              <a:ext uri="{FF2B5EF4-FFF2-40B4-BE49-F238E27FC236}">
+                <a16:creationId xmlns:a16="http://schemas.microsoft.com/office/drawing/2014/main" id="{803047E2-EA04-4CDD-B395-1BA05B593F24}"/>
+              </a:ext>
+            </a:extLst>
+          </p:cNvPr>
+          <p:cNvSpPr/>
+          <p:nvPr/>
+        </p:nvSpPr>
+        <p:spPr>
+          <a:xfrm>
+            <a:off x="4006180" y="2406588"/>
+            <a:ext cx="1440160" cy="432048"/>
+          </a:xfrm>
+          <a:prstGeom prst="rect">
+            <a:avLst/>
+          </a:prstGeom>
+          <a:ln>
+            <a:noFill/>
+          </a:ln>
+        </p:spPr>
+        <p:style>
+          <a:lnRef idx="1">
+            <a:schemeClr val="accent2"/>
+          </a:lnRef>
+          <a:fillRef idx="2">
+            <a:schemeClr val="accent2"/>
+          </a:fillRef>
+          <a:effectRef idx="1">
+            <a:schemeClr val="accent2"/>
+          </a:effectRef>
+          <a:fontRef idx="minor">
+            <a:schemeClr val="dk1"/>
+          </a:fontRef>
+        </p:style>
+        <p:txBody>
+          <a:bodyPr rtlCol="0" anchor="ctr"/>
+          <a:lstStyle/>
+          <a:p>
+            <a:pPr algn="ctr"/>
+            <a:r>
+              <a:rPr lang="es-PE" dirty="0"/>
+              <a:t>Gray </a:t>
+            </a:r>
+            <a:r>
+              <a:rPr lang="es-PE" dirty="0" err="1"/>
+              <a:t>Scale</a:t>
+            </a:r>
+            <a:endParaRPr lang="es-PE" dirty="0"/>
+          </a:p>
+        </p:txBody>
+      </p:sp>
+      <p:sp>
+        <p:nvSpPr>
+          <p:cNvPr id="6" name="Rectángulo 5">
+            <a:extLst>
+              <a:ext uri="{FF2B5EF4-FFF2-40B4-BE49-F238E27FC236}">
+                <a16:creationId xmlns:a16="http://schemas.microsoft.com/office/drawing/2014/main" id="{C99C99E6-3007-4971-BF73-AD96F7CD6E12}"/>
+              </a:ext>
+            </a:extLst>
+          </p:cNvPr>
+          <p:cNvSpPr/>
+          <p:nvPr/>
+        </p:nvSpPr>
+        <p:spPr>
+          <a:xfrm>
+            <a:off x="6418448" y="2406588"/>
+            <a:ext cx="1646712" cy="432048"/>
+          </a:xfrm>
+          <a:prstGeom prst="rect">
+            <a:avLst/>
+          </a:prstGeom>
+          <a:ln>
+            <a:noFill/>
+          </a:ln>
+        </p:spPr>
+        <p:style>
+          <a:lnRef idx="1">
+            <a:schemeClr val="accent2"/>
+          </a:lnRef>
+          <a:fillRef idx="2">
+            <a:schemeClr val="accent2"/>
+          </a:fillRef>
+          <a:effectRef idx="1">
+            <a:schemeClr val="accent2"/>
+          </a:effectRef>
+          <a:fontRef idx="minor">
+            <a:schemeClr val="dk1"/>
+          </a:fontRef>
+        </p:style>
+        <p:txBody>
+          <a:bodyPr rtlCol="0" anchor="ctr"/>
+          <a:lstStyle/>
+          <a:p>
+            <a:pPr algn="ctr"/>
+            <a:r>
+              <a:rPr lang="es-PE" dirty="0" err="1"/>
+              <a:t>cv</a:t>
+            </a:r>
+            <a:r>
+              <a:rPr lang="es-PE" dirty="0"/>
+              <a:t>::</a:t>
+            </a:r>
+            <a:r>
+              <a:rPr lang="es-PE" dirty="0" err="1"/>
+              <a:t>cvtColor</a:t>
+            </a:r>
+            <a:r>
+              <a:rPr lang="es-PE" dirty="0"/>
+              <a:t> </a:t>
+            </a:r>
+          </a:p>
+        </p:txBody>
+      </p:sp>
+      <p:sp>
+        <p:nvSpPr>
+          <p:cNvPr id="7" name="Rectángulo 6">
+            <a:extLst>
+              <a:ext uri="{FF2B5EF4-FFF2-40B4-BE49-F238E27FC236}">
+                <a16:creationId xmlns:a16="http://schemas.microsoft.com/office/drawing/2014/main" id="{7E0F958C-1F06-459E-AE5E-C1EE64176EF5}"/>
+              </a:ext>
+            </a:extLst>
+          </p:cNvPr>
+          <p:cNvSpPr/>
+          <p:nvPr/>
+        </p:nvSpPr>
+        <p:spPr>
+          <a:xfrm>
+            <a:off x="3826160" y="3126668"/>
+            <a:ext cx="1800200" cy="432048"/>
+          </a:xfrm>
+          <a:prstGeom prst="rect">
+            <a:avLst/>
+          </a:prstGeom>
+          <a:ln>
+            <a:noFill/>
+          </a:ln>
+        </p:spPr>
+        <p:style>
+          <a:lnRef idx="1">
+            <a:schemeClr val="accent2"/>
+          </a:lnRef>
+          <a:fillRef idx="2">
+            <a:schemeClr val="accent2"/>
+          </a:fillRef>
+          <a:effectRef idx="1">
+            <a:schemeClr val="accent2"/>
+          </a:effectRef>
+          <a:fontRef idx="minor">
+            <a:schemeClr val="dk1"/>
+          </a:fontRef>
+        </p:style>
+        <p:txBody>
+          <a:bodyPr rtlCol="0" anchor="ctr"/>
+          <a:lstStyle/>
+          <a:p>
+            <a:pPr algn="ctr"/>
+            <a:r>
+              <a:rPr lang="es-PE" dirty="0"/>
+              <a:t>Gaussian </a:t>
+            </a:r>
+            <a:r>
+              <a:rPr lang="es-PE" dirty="0" err="1"/>
+              <a:t>Blur</a:t>
+            </a:r>
+            <a:endParaRPr lang="es-PE" dirty="0"/>
+          </a:p>
+        </p:txBody>
+      </p:sp>
+      <p:sp>
+        <p:nvSpPr>
+          <p:cNvPr id="8" name="Rectángulo 7">
+            <a:extLst>
+              <a:ext uri="{FF2B5EF4-FFF2-40B4-BE49-F238E27FC236}">
+                <a16:creationId xmlns:a16="http://schemas.microsoft.com/office/drawing/2014/main" id="{E3AF19C8-E733-479E-AF56-E420465FEF25}"/>
+              </a:ext>
+            </a:extLst>
+          </p:cNvPr>
+          <p:cNvSpPr/>
+          <p:nvPr/>
+        </p:nvSpPr>
+        <p:spPr>
+          <a:xfrm>
+            <a:off x="6408976" y="3126668"/>
+            <a:ext cx="1656184" cy="432048"/>
+          </a:xfrm>
+          <a:prstGeom prst="rect">
+            <a:avLst/>
+          </a:prstGeom>
+          <a:ln>
+            <a:noFill/>
+          </a:ln>
+        </p:spPr>
+        <p:style>
+          <a:lnRef idx="1">
+            <a:schemeClr val="accent2"/>
+          </a:lnRef>
+          <a:fillRef idx="2">
+            <a:schemeClr val="accent2"/>
+          </a:fillRef>
+          <a:effectRef idx="1">
+            <a:schemeClr val="accent2"/>
+          </a:effectRef>
+          <a:fontRef idx="minor">
+            <a:schemeClr val="dk1"/>
+          </a:fontRef>
+        </p:style>
+        <p:txBody>
+          <a:bodyPr rtlCol="0" anchor="ctr"/>
+          <a:lstStyle/>
+          <a:p>
+            <a:pPr algn="ctr"/>
+            <a:r>
+              <a:rPr lang="es-PE" dirty="0" err="1"/>
+              <a:t>cv</a:t>
+            </a:r>
+            <a:r>
+              <a:rPr lang="es-PE" dirty="0"/>
+              <a:t>::</a:t>
+            </a:r>
+            <a:r>
+              <a:rPr lang="es-PE" dirty="0" err="1"/>
+              <a:t>blur</a:t>
+            </a:r>
+            <a:endParaRPr lang="es-PE" dirty="0"/>
+          </a:p>
+        </p:txBody>
+      </p:sp>
+      <p:sp>
+        <p:nvSpPr>
+          <p:cNvPr id="9" name="Rectángulo 8">
+            <a:extLst>
+              <a:ext uri="{FF2B5EF4-FFF2-40B4-BE49-F238E27FC236}">
+                <a16:creationId xmlns:a16="http://schemas.microsoft.com/office/drawing/2014/main" id="{2FAD062C-8CFD-4EB1-A7DD-8E3A41E1834F}"/>
+              </a:ext>
+            </a:extLst>
+          </p:cNvPr>
+          <p:cNvSpPr/>
+          <p:nvPr/>
+        </p:nvSpPr>
+        <p:spPr>
+          <a:xfrm>
+            <a:off x="4006180" y="3882752"/>
+            <a:ext cx="1440160" cy="432048"/>
+          </a:xfrm>
+          <a:prstGeom prst="rect">
+            <a:avLst/>
+          </a:prstGeom>
+          <a:ln>
+            <a:noFill/>
+          </a:ln>
+        </p:spPr>
+        <p:style>
+          <a:lnRef idx="1">
+            <a:schemeClr val="accent2"/>
+          </a:lnRef>
+          <a:fillRef idx="2">
+            <a:schemeClr val="accent2"/>
+          </a:fillRef>
+          <a:effectRef idx="1">
+            <a:schemeClr val="accent2"/>
+          </a:effectRef>
+          <a:fontRef idx="minor">
+            <a:schemeClr val="dk1"/>
+          </a:fontRef>
+        </p:style>
+        <p:txBody>
+          <a:bodyPr rtlCol="0" anchor="ctr"/>
+          <a:lstStyle/>
+          <a:p>
+            <a:pPr algn="ctr"/>
+            <a:r>
+              <a:rPr lang="es-PE" dirty="0" err="1"/>
+              <a:t>Threshold</a:t>
+            </a:r>
+            <a:endParaRPr lang="es-PE" dirty="0"/>
+          </a:p>
+        </p:txBody>
+      </p:sp>
+      <p:sp>
+        <p:nvSpPr>
+          <p:cNvPr id="10" name="Rectángulo 9">
+            <a:extLst>
+              <a:ext uri="{FF2B5EF4-FFF2-40B4-BE49-F238E27FC236}">
+                <a16:creationId xmlns:a16="http://schemas.microsoft.com/office/drawing/2014/main" id="{2489486B-6FEC-4643-9A6E-8458FA0907D6}"/>
+              </a:ext>
+            </a:extLst>
+          </p:cNvPr>
+          <p:cNvSpPr/>
+          <p:nvPr/>
+        </p:nvSpPr>
+        <p:spPr>
+          <a:xfrm>
+            <a:off x="6408976" y="3882752"/>
+            <a:ext cx="1656184" cy="432048"/>
+          </a:xfrm>
+          <a:prstGeom prst="rect">
+            <a:avLst/>
+          </a:prstGeom>
+          <a:ln>
+            <a:noFill/>
+          </a:ln>
+        </p:spPr>
+        <p:style>
+          <a:lnRef idx="1">
+            <a:schemeClr val="accent2"/>
+          </a:lnRef>
+          <a:fillRef idx="2">
+            <a:schemeClr val="accent2"/>
+          </a:fillRef>
+          <a:effectRef idx="1">
+            <a:schemeClr val="accent2"/>
+          </a:effectRef>
+          <a:fontRef idx="minor">
+            <a:schemeClr val="dk1"/>
+          </a:fontRef>
+        </p:style>
+        <p:txBody>
+          <a:bodyPr rtlCol="0" anchor="ctr"/>
+          <a:lstStyle/>
+          <a:p>
+            <a:pPr algn="ctr"/>
+            <a:r>
+              <a:rPr lang="es-PE" dirty="0" err="1"/>
+              <a:t>cv</a:t>
+            </a:r>
+            <a:r>
+              <a:rPr lang="es-PE" dirty="0"/>
+              <a:t>::</a:t>
+            </a:r>
+            <a:r>
+              <a:rPr lang="es-PE" dirty="0" err="1"/>
+              <a:t>threshold</a:t>
+            </a:r>
+            <a:endParaRPr lang="es-PE" dirty="0"/>
+          </a:p>
+        </p:txBody>
+      </p:sp>
+      <p:sp>
+        <p:nvSpPr>
+          <p:cNvPr id="11" name="Rectángulo 10">
+            <a:extLst>
+              <a:ext uri="{FF2B5EF4-FFF2-40B4-BE49-F238E27FC236}">
+                <a16:creationId xmlns:a16="http://schemas.microsoft.com/office/drawing/2014/main" id="{2E0904CF-C319-482D-8182-847EC0CB720C}"/>
+              </a:ext>
+            </a:extLst>
+          </p:cNvPr>
+          <p:cNvSpPr/>
+          <p:nvPr/>
+        </p:nvSpPr>
+        <p:spPr>
+          <a:xfrm>
+            <a:off x="3790156" y="4632934"/>
+            <a:ext cx="1872208" cy="432048"/>
+          </a:xfrm>
+          <a:prstGeom prst="rect">
+            <a:avLst/>
+          </a:prstGeom>
+          <a:ln>
+            <a:noFill/>
+          </a:ln>
+        </p:spPr>
+        <p:style>
+          <a:lnRef idx="1">
+            <a:schemeClr val="accent2"/>
+          </a:lnRef>
+          <a:fillRef idx="2">
+            <a:schemeClr val="accent2"/>
+          </a:fillRef>
+          <a:effectRef idx="1">
+            <a:schemeClr val="accent2"/>
+          </a:effectRef>
+          <a:fontRef idx="minor">
+            <a:schemeClr val="dk1"/>
+          </a:fontRef>
+        </p:style>
+        <p:txBody>
+          <a:bodyPr rtlCol="0" anchor="ctr"/>
+          <a:lstStyle/>
+          <a:p>
+            <a:pPr algn="ctr"/>
+            <a:r>
+              <a:rPr lang="es-PE" dirty="0" err="1"/>
+              <a:t>Find</a:t>
+            </a:r>
+            <a:r>
+              <a:rPr lang="es-PE" dirty="0"/>
+              <a:t> </a:t>
+            </a:r>
+            <a:r>
+              <a:rPr lang="es-PE" dirty="0" err="1"/>
+              <a:t>Contour</a:t>
+            </a:r>
+            <a:r>
+              <a:rPr lang="es-PE" dirty="0"/>
+              <a:t> </a:t>
+            </a:r>
+          </a:p>
+        </p:txBody>
+      </p:sp>
+      <p:sp>
+        <p:nvSpPr>
+          <p:cNvPr id="12" name="Rectángulo 11">
+            <a:extLst>
+              <a:ext uri="{FF2B5EF4-FFF2-40B4-BE49-F238E27FC236}">
+                <a16:creationId xmlns:a16="http://schemas.microsoft.com/office/drawing/2014/main" id="{F3FE6243-3786-4E05-B572-CF241B95783F}"/>
+              </a:ext>
+            </a:extLst>
+          </p:cNvPr>
+          <p:cNvSpPr/>
+          <p:nvPr/>
+        </p:nvSpPr>
+        <p:spPr>
+          <a:xfrm>
+            <a:off x="6418448" y="4638836"/>
+            <a:ext cx="1646712" cy="432048"/>
+          </a:xfrm>
+          <a:prstGeom prst="rect">
+            <a:avLst/>
+          </a:prstGeom>
+          <a:ln>
+            <a:noFill/>
+          </a:ln>
+        </p:spPr>
+        <p:style>
+          <a:lnRef idx="1">
+            <a:schemeClr val="accent2"/>
+          </a:lnRef>
+          <a:fillRef idx="2">
+            <a:schemeClr val="accent2"/>
+          </a:fillRef>
+          <a:effectRef idx="1">
+            <a:schemeClr val="accent2"/>
+          </a:effectRef>
+          <a:fontRef idx="minor">
+            <a:schemeClr val="dk1"/>
+          </a:fontRef>
+        </p:style>
+        <p:txBody>
+          <a:bodyPr rtlCol="0" anchor="ctr"/>
+          <a:lstStyle/>
+          <a:p>
+            <a:pPr algn="ctr"/>
+            <a:r>
+              <a:rPr lang="es-PE" dirty="0" err="1"/>
+              <a:t>cv</a:t>
+            </a:r>
+            <a:r>
+              <a:rPr lang="es-PE" dirty="0"/>
+              <a:t>::</a:t>
+            </a:r>
+            <a:r>
+              <a:rPr lang="es-PE" dirty="0" err="1"/>
+              <a:t>Canny</a:t>
+            </a:r>
+            <a:r>
+              <a:rPr lang="es-PE" dirty="0"/>
+              <a:t> </a:t>
+            </a:r>
+          </a:p>
+        </p:txBody>
+      </p:sp>
+      <p:sp>
+        <p:nvSpPr>
+          <p:cNvPr id="13" name="Rectángulo 12">
+            <a:extLst>
+              <a:ext uri="{FF2B5EF4-FFF2-40B4-BE49-F238E27FC236}">
+                <a16:creationId xmlns:a16="http://schemas.microsoft.com/office/drawing/2014/main" id="{259394A0-BC27-4FC8-87E7-3EF5C226E57B}"/>
+              </a:ext>
+            </a:extLst>
+          </p:cNvPr>
+          <p:cNvSpPr/>
+          <p:nvPr/>
+        </p:nvSpPr>
+        <p:spPr>
+          <a:xfrm>
+            <a:off x="8578688" y="4638836"/>
+            <a:ext cx="1944216" cy="432048"/>
+          </a:xfrm>
+          <a:prstGeom prst="rect">
+            <a:avLst/>
+          </a:prstGeom>
+          <a:ln>
+            <a:noFill/>
+          </a:ln>
+        </p:spPr>
+        <p:style>
+          <a:lnRef idx="1">
+            <a:schemeClr val="accent2"/>
+          </a:lnRef>
+          <a:fillRef idx="2">
+            <a:schemeClr val="accent2"/>
+          </a:fillRef>
+          <a:effectRef idx="1">
+            <a:schemeClr val="accent2"/>
+          </a:effectRef>
+          <a:fontRef idx="minor">
+            <a:schemeClr val="dk1"/>
+          </a:fontRef>
+        </p:style>
+        <p:txBody>
+          <a:bodyPr rtlCol="0" anchor="ctr"/>
+          <a:lstStyle/>
+          <a:p>
+            <a:pPr algn="ctr"/>
+            <a:r>
+              <a:rPr lang="es-PE"/>
+              <a:t>cv::findContour </a:t>
+            </a:r>
+            <a:endParaRPr lang="es-PE" dirty="0"/>
+          </a:p>
+        </p:txBody>
+      </p:sp>
+      <p:sp>
+        <p:nvSpPr>
+          <p:cNvPr id="14" name="Rectángulo 13">
+            <a:extLst>
+              <a:ext uri="{FF2B5EF4-FFF2-40B4-BE49-F238E27FC236}">
+                <a16:creationId xmlns:a16="http://schemas.microsoft.com/office/drawing/2014/main" id="{02CE727B-D612-4E08-8BCC-263AEA7DE72C}"/>
+              </a:ext>
+            </a:extLst>
+          </p:cNvPr>
+          <p:cNvSpPr/>
+          <p:nvPr/>
+        </p:nvSpPr>
+        <p:spPr>
+          <a:xfrm>
+            <a:off x="3898168" y="5291602"/>
+            <a:ext cx="1656184" cy="432048"/>
+          </a:xfrm>
+          <a:prstGeom prst="rect">
+            <a:avLst/>
+          </a:prstGeom>
+          <a:ln>
+            <a:noFill/>
+          </a:ln>
+        </p:spPr>
+        <p:style>
+          <a:lnRef idx="1">
+            <a:schemeClr val="accent2"/>
+          </a:lnRef>
+          <a:fillRef idx="2">
+            <a:schemeClr val="accent2"/>
+          </a:fillRef>
+          <a:effectRef idx="1">
+            <a:schemeClr val="accent2"/>
+          </a:effectRef>
+          <a:fontRef idx="minor">
+            <a:schemeClr val="dk1"/>
+          </a:fontRef>
+        </p:style>
+        <p:txBody>
+          <a:bodyPr rtlCol="0" anchor="ctr"/>
+          <a:lstStyle/>
+          <a:p>
+            <a:pPr algn="ctr"/>
+            <a:r>
+              <a:rPr lang="es-PE" dirty="0"/>
+              <a:t>Min </a:t>
+            </a:r>
+            <a:r>
+              <a:rPr lang="es-PE" dirty="0" err="1"/>
+              <a:t>AreaRect</a:t>
+            </a:r>
+            <a:r>
+              <a:rPr lang="es-PE" dirty="0"/>
+              <a:t> </a:t>
+            </a:r>
+          </a:p>
+        </p:txBody>
+      </p:sp>
+      <p:sp>
+        <p:nvSpPr>
+          <p:cNvPr id="15" name="Rectángulo 14">
+            <a:extLst>
+              <a:ext uri="{FF2B5EF4-FFF2-40B4-BE49-F238E27FC236}">
+                <a16:creationId xmlns:a16="http://schemas.microsoft.com/office/drawing/2014/main" id="{9DB58971-66FA-4EA2-9F2F-27B4290F410C}"/>
+              </a:ext>
+            </a:extLst>
+          </p:cNvPr>
+          <p:cNvSpPr/>
+          <p:nvPr/>
+        </p:nvSpPr>
+        <p:spPr>
+          <a:xfrm>
+            <a:off x="6418448" y="5286908"/>
+            <a:ext cx="1872208" cy="432048"/>
+          </a:xfrm>
+          <a:prstGeom prst="rect">
+            <a:avLst/>
+          </a:prstGeom>
+          <a:ln>
+            <a:noFill/>
+          </a:ln>
+        </p:spPr>
+        <p:style>
+          <a:lnRef idx="1">
+            <a:schemeClr val="accent2"/>
+          </a:lnRef>
+          <a:fillRef idx="2">
+            <a:schemeClr val="accent2"/>
+          </a:fillRef>
+          <a:effectRef idx="1">
+            <a:schemeClr val="accent2"/>
+          </a:effectRef>
+          <a:fontRef idx="minor">
+            <a:schemeClr val="dk1"/>
+          </a:fontRef>
+        </p:style>
+        <p:txBody>
+          <a:bodyPr rtlCol="0" anchor="ctr"/>
+          <a:lstStyle/>
+          <a:p>
+            <a:pPr algn="ctr"/>
+            <a:r>
+              <a:rPr lang="es-PE" dirty="0" err="1"/>
+              <a:t>cv</a:t>
+            </a:r>
+            <a:r>
+              <a:rPr lang="es-PE" dirty="0"/>
+              <a:t>::</a:t>
+            </a:r>
+            <a:r>
+              <a:rPr lang="es-PE" dirty="0" err="1"/>
+              <a:t>minAreaRect</a:t>
+            </a:r>
+            <a:r>
+              <a:rPr lang="es-PE" dirty="0"/>
+              <a:t> </a:t>
+            </a:r>
+          </a:p>
+        </p:txBody>
+      </p:sp>
+      <p:sp>
+        <p:nvSpPr>
+          <p:cNvPr id="16" name="Rectángulo 15">
+            <a:extLst>
+              <a:ext uri="{FF2B5EF4-FFF2-40B4-BE49-F238E27FC236}">
+                <a16:creationId xmlns:a16="http://schemas.microsoft.com/office/drawing/2014/main" id="{CF0D2BE1-D23E-435D-A08E-32544F800A45}"/>
+              </a:ext>
+            </a:extLst>
+          </p:cNvPr>
+          <p:cNvSpPr/>
+          <p:nvPr/>
+        </p:nvSpPr>
+        <p:spPr>
+          <a:xfrm>
+            <a:off x="3880166" y="6014149"/>
+            <a:ext cx="1692188" cy="432048"/>
+          </a:xfrm>
+          <a:prstGeom prst="rect">
+            <a:avLst/>
+          </a:prstGeom>
+          <a:ln>
+            <a:noFill/>
+          </a:ln>
+        </p:spPr>
+        <p:style>
+          <a:lnRef idx="1">
+            <a:schemeClr val="accent2"/>
+          </a:lnRef>
+          <a:fillRef idx="2">
+            <a:schemeClr val="accent2"/>
+          </a:fillRef>
+          <a:effectRef idx="1">
+            <a:schemeClr val="accent2"/>
+          </a:effectRef>
+          <a:fontRef idx="minor">
+            <a:schemeClr val="dk1"/>
+          </a:fontRef>
+        </p:style>
+        <p:txBody>
+          <a:bodyPr rtlCol="0" anchor="ctr"/>
+          <a:lstStyle/>
+          <a:p>
+            <a:pPr algn="ctr"/>
+            <a:r>
+              <a:rPr lang="es-PE" dirty="0" err="1"/>
+              <a:t>Fit</a:t>
+            </a:r>
+            <a:r>
+              <a:rPr lang="es-PE" dirty="0"/>
+              <a:t> </a:t>
+            </a:r>
+            <a:r>
+              <a:rPr lang="es-PE" dirty="0" err="1"/>
+              <a:t>Ellipse</a:t>
+            </a:r>
+            <a:r>
+              <a:rPr lang="es-PE" dirty="0"/>
+              <a:t> </a:t>
+            </a:r>
+          </a:p>
+        </p:txBody>
+      </p:sp>
+      <p:sp>
+        <p:nvSpPr>
+          <p:cNvPr id="17" name="Rectángulo 16">
+            <a:extLst>
+              <a:ext uri="{FF2B5EF4-FFF2-40B4-BE49-F238E27FC236}">
+                <a16:creationId xmlns:a16="http://schemas.microsoft.com/office/drawing/2014/main" id="{8DCDCF55-A91E-4871-A452-F1B0CE1BCB42}"/>
+              </a:ext>
+            </a:extLst>
+          </p:cNvPr>
+          <p:cNvSpPr/>
+          <p:nvPr/>
+        </p:nvSpPr>
+        <p:spPr>
+          <a:xfrm>
+            <a:off x="6418448" y="6014149"/>
+            <a:ext cx="1872208" cy="432048"/>
+          </a:xfrm>
+          <a:prstGeom prst="rect">
+            <a:avLst/>
+          </a:prstGeom>
+          <a:ln>
+            <a:noFill/>
+          </a:ln>
+        </p:spPr>
+        <p:style>
+          <a:lnRef idx="1">
+            <a:schemeClr val="accent2"/>
+          </a:lnRef>
+          <a:fillRef idx="2">
+            <a:schemeClr val="accent2"/>
+          </a:fillRef>
+          <a:effectRef idx="1">
+            <a:schemeClr val="accent2"/>
+          </a:effectRef>
+          <a:fontRef idx="minor">
+            <a:schemeClr val="dk1"/>
+          </a:fontRef>
+        </p:style>
+        <p:txBody>
+          <a:bodyPr rtlCol="0" anchor="ctr"/>
+          <a:lstStyle/>
+          <a:p>
+            <a:pPr algn="ctr"/>
+            <a:r>
+              <a:rPr lang="es-PE" dirty="0" err="1"/>
+              <a:t>cv</a:t>
+            </a:r>
+            <a:r>
+              <a:rPr lang="es-PE" dirty="0"/>
+              <a:t>::</a:t>
+            </a:r>
+            <a:r>
+              <a:rPr lang="es-PE" dirty="0" err="1"/>
+              <a:t>fitEllipse</a:t>
+            </a:r>
+            <a:r>
+              <a:rPr lang="es-PE" dirty="0"/>
+              <a:t> </a:t>
+            </a:r>
+          </a:p>
+        </p:txBody>
+      </p:sp>
+      <p:cxnSp>
+        <p:nvCxnSpPr>
+          <p:cNvPr id="19" name="Conector recto de flecha 18">
+            <a:extLst>
+              <a:ext uri="{FF2B5EF4-FFF2-40B4-BE49-F238E27FC236}">
+                <a16:creationId xmlns:a16="http://schemas.microsoft.com/office/drawing/2014/main" id="{F259AE84-ADDB-40E7-925B-F37594A09284}"/>
+              </a:ext>
+            </a:extLst>
+          </p:cNvPr>
+          <p:cNvCxnSpPr>
+            <a:stCxn id="4" idx="2"/>
+          </p:cNvCxnSpPr>
+          <p:nvPr/>
+        </p:nvCxnSpPr>
+        <p:spPr>
+          <a:xfrm>
+            <a:off x="4690256" y="2200905"/>
+            <a:ext cx="0" cy="216024"/>
+          </a:xfrm>
+          <a:prstGeom prst="straightConnector1">
+            <a:avLst/>
+          </a:prstGeom>
+          <a:ln>
+            <a:tailEnd type="triangle"/>
+          </a:ln>
+        </p:spPr>
+        <p:style>
+          <a:lnRef idx="1">
+            <a:schemeClr val="accent1"/>
+          </a:lnRef>
+          <a:fillRef idx="0">
+            <a:schemeClr val="accent1"/>
+          </a:fillRef>
+          <a:effectRef idx="0">
+            <a:schemeClr val="accent1"/>
+          </a:effectRef>
+          <a:fontRef idx="minor">
+            <a:schemeClr val="tx1"/>
+          </a:fontRef>
+        </p:style>
+      </p:cxnSp>
+      <p:cxnSp>
+        <p:nvCxnSpPr>
+          <p:cNvPr id="21" name="Conector recto de flecha 20">
+            <a:extLst>
+              <a:ext uri="{FF2B5EF4-FFF2-40B4-BE49-F238E27FC236}">
+                <a16:creationId xmlns:a16="http://schemas.microsoft.com/office/drawing/2014/main" id="{D6B46F8E-842E-4200-9056-673982CAC973}"/>
+              </a:ext>
+            </a:extLst>
+          </p:cNvPr>
+          <p:cNvCxnSpPr>
+            <a:stCxn id="5" idx="2"/>
+            <a:endCxn id="7" idx="0"/>
+          </p:cNvCxnSpPr>
+          <p:nvPr/>
+        </p:nvCxnSpPr>
+        <p:spPr>
+          <a:xfrm>
+            <a:off x="4726260" y="2838636"/>
+            <a:ext cx="0" cy="288032"/>
+          </a:xfrm>
+          <a:prstGeom prst="straightConnector1">
+            <a:avLst/>
+          </a:prstGeom>
+          <a:ln>
+            <a:tailEnd type="triangle"/>
+          </a:ln>
+        </p:spPr>
+        <p:style>
+          <a:lnRef idx="1">
+            <a:schemeClr val="accent1"/>
+          </a:lnRef>
+          <a:fillRef idx="0">
+            <a:schemeClr val="accent1"/>
+          </a:fillRef>
+          <a:effectRef idx="0">
+            <a:schemeClr val="accent1"/>
+          </a:effectRef>
+          <a:fontRef idx="minor">
+            <a:schemeClr val="tx1"/>
+          </a:fontRef>
+        </p:style>
+      </p:cxnSp>
+      <p:cxnSp>
+        <p:nvCxnSpPr>
+          <p:cNvPr id="24" name="Conector recto de flecha 23">
+            <a:extLst>
+              <a:ext uri="{FF2B5EF4-FFF2-40B4-BE49-F238E27FC236}">
+                <a16:creationId xmlns:a16="http://schemas.microsoft.com/office/drawing/2014/main" id="{51458B0B-620B-4400-AA6C-13754F3520DF}"/>
+              </a:ext>
+            </a:extLst>
+          </p:cNvPr>
+          <p:cNvCxnSpPr>
+            <a:stCxn id="7" idx="2"/>
+            <a:endCxn id="9" idx="0"/>
+          </p:cNvCxnSpPr>
+          <p:nvPr/>
+        </p:nvCxnSpPr>
+        <p:spPr>
+          <a:xfrm>
+            <a:off x="4726260" y="3558716"/>
+            <a:ext cx="0" cy="324036"/>
+          </a:xfrm>
+          <a:prstGeom prst="straightConnector1">
+            <a:avLst/>
+          </a:prstGeom>
+          <a:ln>
+            <a:tailEnd type="triangle"/>
+          </a:ln>
+        </p:spPr>
+        <p:style>
+          <a:lnRef idx="1">
+            <a:schemeClr val="accent1"/>
+          </a:lnRef>
+          <a:fillRef idx="0">
+            <a:schemeClr val="accent1"/>
+          </a:fillRef>
+          <a:effectRef idx="0">
+            <a:schemeClr val="accent1"/>
+          </a:effectRef>
+          <a:fontRef idx="minor">
+            <a:schemeClr val="tx1"/>
+          </a:fontRef>
+        </p:style>
+      </p:cxnSp>
+      <p:cxnSp>
+        <p:nvCxnSpPr>
+          <p:cNvPr id="26" name="Conector recto de flecha 25">
+            <a:extLst>
+              <a:ext uri="{FF2B5EF4-FFF2-40B4-BE49-F238E27FC236}">
+                <a16:creationId xmlns:a16="http://schemas.microsoft.com/office/drawing/2014/main" id="{890D5B91-C905-486B-8B93-52681A69195D}"/>
+              </a:ext>
+            </a:extLst>
+          </p:cNvPr>
+          <p:cNvCxnSpPr>
+            <a:stCxn id="9" idx="2"/>
+            <a:endCxn id="11" idx="0"/>
+          </p:cNvCxnSpPr>
+          <p:nvPr/>
+        </p:nvCxnSpPr>
+        <p:spPr>
+          <a:xfrm>
+            <a:off x="4726260" y="4314800"/>
+            <a:ext cx="0" cy="318134"/>
+          </a:xfrm>
+          <a:prstGeom prst="straightConnector1">
+            <a:avLst/>
+          </a:prstGeom>
+          <a:ln>
+            <a:tailEnd type="triangle"/>
+          </a:ln>
+        </p:spPr>
+        <p:style>
+          <a:lnRef idx="1">
+            <a:schemeClr val="accent1"/>
+          </a:lnRef>
+          <a:fillRef idx="0">
+            <a:schemeClr val="accent1"/>
+          </a:fillRef>
+          <a:effectRef idx="0">
+            <a:schemeClr val="accent1"/>
+          </a:effectRef>
+          <a:fontRef idx="minor">
+            <a:schemeClr val="tx1"/>
+          </a:fontRef>
+        </p:style>
+      </p:cxnSp>
+      <p:cxnSp>
+        <p:nvCxnSpPr>
+          <p:cNvPr id="29" name="Conector recto de flecha 28">
+            <a:extLst>
+              <a:ext uri="{FF2B5EF4-FFF2-40B4-BE49-F238E27FC236}">
+                <a16:creationId xmlns:a16="http://schemas.microsoft.com/office/drawing/2014/main" id="{4E1946A0-BE5C-4077-B7B5-E29EF8979D0C}"/>
+              </a:ext>
+            </a:extLst>
+          </p:cNvPr>
+          <p:cNvCxnSpPr>
+            <a:stCxn id="11" idx="2"/>
+            <a:endCxn id="14" idx="0"/>
+          </p:cNvCxnSpPr>
+          <p:nvPr/>
+        </p:nvCxnSpPr>
+        <p:spPr>
+          <a:xfrm>
+            <a:off x="4726260" y="5064982"/>
+            <a:ext cx="0" cy="226620"/>
+          </a:xfrm>
+          <a:prstGeom prst="straightConnector1">
+            <a:avLst/>
+          </a:prstGeom>
+          <a:ln>
+            <a:tailEnd type="triangle"/>
+          </a:ln>
+        </p:spPr>
+        <p:style>
+          <a:lnRef idx="1">
+            <a:schemeClr val="accent1"/>
+          </a:lnRef>
+          <a:fillRef idx="0">
+            <a:schemeClr val="accent1"/>
+          </a:fillRef>
+          <a:effectRef idx="0">
+            <a:schemeClr val="accent1"/>
+          </a:effectRef>
+          <a:fontRef idx="minor">
+            <a:schemeClr val="tx1"/>
+          </a:fontRef>
+        </p:style>
+      </p:cxnSp>
+      <p:cxnSp>
+        <p:nvCxnSpPr>
+          <p:cNvPr id="31" name="Conector recto de flecha 30">
+            <a:extLst>
+              <a:ext uri="{FF2B5EF4-FFF2-40B4-BE49-F238E27FC236}">
+                <a16:creationId xmlns:a16="http://schemas.microsoft.com/office/drawing/2014/main" id="{19FE43F6-8569-4DEC-A105-09A468D3FDC7}"/>
+              </a:ext>
+            </a:extLst>
+          </p:cNvPr>
+          <p:cNvCxnSpPr>
+            <a:stCxn id="14" idx="2"/>
+            <a:endCxn id="16" idx="0"/>
+          </p:cNvCxnSpPr>
+          <p:nvPr/>
+        </p:nvCxnSpPr>
+        <p:spPr>
+          <a:xfrm>
+            <a:off x="4726260" y="5723650"/>
+            <a:ext cx="0" cy="290499"/>
+          </a:xfrm>
+          <a:prstGeom prst="straightConnector1">
+            <a:avLst/>
+          </a:prstGeom>
+          <a:ln>
+            <a:tailEnd type="triangle"/>
+          </a:ln>
+        </p:spPr>
+        <p:style>
+          <a:lnRef idx="1">
+            <a:schemeClr val="accent1"/>
+          </a:lnRef>
+          <a:fillRef idx="0">
+            <a:schemeClr val="accent1"/>
+          </a:fillRef>
+          <a:effectRef idx="0">
+            <a:schemeClr val="accent1"/>
+          </a:effectRef>
+          <a:fontRef idx="minor">
+            <a:schemeClr val="tx1"/>
+          </a:fontRef>
+        </p:style>
+      </p:cxnSp>
+      <p:cxnSp>
+        <p:nvCxnSpPr>
+          <p:cNvPr id="34" name="Conector recto de flecha 33">
+            <a:extLst>
+              <a:ext uri="{FF2B5EF4-FFF2-40B4-BE49-F238E27FC236}">
+                <a16:creationId xmlns:a16="http://schemas.microsoft.com/office/drawing/2014/main" id="{E3B64CE0-B88F-49FE-A30A-263F842908EA}"/>
+              </a:ext>
+            </a:extLst>
+          </p:cNvPr>
+          <p:cNvCxnSpPr>
+            <a:stCxn id="5" idx="3"/>
+            <a:endCxn id="6" idx="1"/>
+          </p:cNvCxnSpPr>
+          <p:nvPr/>
+        </p:nvCxnSpPr>
+        <p:spPr>
+          <a:xfrm>
+            <a:off x="5446340" y="2622612"/>
+            <a:ext cx="972108" cy="0"/>
+          </a:xfrm>
+          <a:prstGeom prst="straightConnector1">
+            <a:avLst/>
+          </a:prstGeom>
+          <a:ln>
+            <a:tailEnd type="triangle"/>
+          </a:ln>
+        </p:spPr>
+        <p:style>
+          <a:lnRef idx="1">
+            <a:schemeClr val="accent1"/>
+          </a:lnRef>
+          <a:fillRef idx="0">
+            <a:schemeClr val="accent1"/>
+          </a:fillRef>
+          <a:effectRef idx="0">
+            <a:schemeClr val="accent1"/>
+          </a:effectRef>
+          <a:fontRef idx="minor">
+            <a:schemeClr val="tx1"/>
+          </a:fontRef>
+        </p:style>
+      </p:cxnSp>
+      <p:cxnSp>
+        <p:nvCxnSpPr>
+          <p:cNvPr id="36" name="Conector recto de flecha 35">
+            <a:extLst>
+              <a:ext uri="{FF2B5EF4-FFF2-40B4-BE49-F238E27FC236}">
+                <a16:creationId xmlns:a16="http://schemas.microsoft.com/office/drawing/2014/main" id="{D80190DC-B9BE-454E-B569-75422B48F987}"/>
+              </a:ext>
+            </a:extLst>
+          </p:cNvPr>
+          <p:cNvCxnSpPr>
+            <a:stCxn id="7" idx="3"/>
+            <a:endCxn id="8" idx="1"/>
+          </p:cNvCxnSpPr>
+          <p:nvPr/>
+        </p:nvCxnSpPr>
+        <p:spPr>
+          <a:xfrm>
+            <a:off x="5626360" y="3342692"/>
+            <a:ext cx="782616" cy="0"/>
+          </a:xfrm>
+          <a:prstGeom prst="straightConnector1">
+            <a:avLst/>
+          </a:prstGeom>
+          <a:ln>
+            <a:tailEnd type="triangle"/>
+          </a:ln>
+        </p:spPr>
+        <p:style>
+          <a:lnRef idx="1">
+            <a:schemeClr val="accent1"/>
+          </a:lnRef>
+          <a:fillRef idx="0">
+            <a:schemeClr val="accent1"/>
+          </a:fillRef>
+          <a:effectRef idx="0">
+            <a:schemeClr val="accent1"/>
+          </a:effectRef>
+          <a:fontRef idx="minor">
+            <a:schemeClr val="tx1"/>
+          </a:fontRef>
+        </p:style>
+      </p:cxnSp>
+      <p:cxnSp>
+        <p:nvCxnSpPr>
+          <p:cNvPr id="38" name="Conector recto de flecha 37">
+            <a:extLst>
+              <a:ext uri="{FF2B5EF4-FFF2-40B4-BE49-F238E27FC236}">
+                <a16:creationId xmlns:a16="http://schemas.microsoft.com/office/drawing/2014/main" id="{E932A442-4EE5-4B54-A745-2CBE5AE07375}"/>
+              </a:ext>
+            </a:extLst>
+          </p:cNvPr>
+          <p:cNvCxnSpPr>
+            <a:stCxn id="9" idx="3"/>
+            <a:endCxn id="10" idx="1"/>
+          </p:cNvCxnSpPr>
+          <p:nvPr/>
+        </p:nvCxnSpPr>
+        <p:spPr>
+          <a:xfrm>
+            <a:off x="5446340" y="4098776"/>
+            <a:ext cx="962636" cy="0"/>
+          </a:xfrm>
+          <a:prstGeom prst="straightConnector1">
+            <a:avLst/>
+          </a:prstGeom>
+          <a:ln>
+            <a:tailEnd type="triangle"/>
+          </a:ln>
+        </p:spPr>
+        <p:style>
+          <a:lnRef idx="1">
+            <a:schemeClr val="accent1"/>
+          </a:lnRef>
+          <a:fillRef idx="0">
+            <a:schemeClr val="accent1"/>
+          </a:fillRef>
+          <a:effectRef idx="0">
+            <a:schemeClr val="accent1"/>
+          </a:effectRef>
+          <a:fontRef idx="minor">
+            <a:schemeClr val="tx1"/>
+          </a:fontRef>
+        </p:style>
+      </p:cxnSp>
+      <p:cxnSp>
+        <p:nvCxnSpPr>
+          <p:cNvPr id="40" name="Conector recto de flecha 39">
+            <a:extLst>
+              <a:ext uri="{FF2B5EF4-FFF2-40B4-BE49-F238E27FC236}">
+                <a16:creationId xmlns:a16="http://schemas.microsoft.com/office/drawing/2014/main" id="{B01AF167-6CDC-4D41-8936-57115C185E24}"/>
+              </a:ext>
+            </a:extLst>
+          </p:cNvPr>
+          <p:cNvCxnSpPr>
+            <a:stCxn id="11" idx="3"/>
+            <a:endCxn id="12" idx="1"/>
+          </p:cNvCxnSpPr>
+          <p:nvPr/>
+        </p:nvCxnSpPr>
+        <p:spPr>
+          <a:xfrm>
+            <a:off x="5662364" y="4848958"/>
+            <a:ext cx="756084" cy="5902"/>
+          </a:xfrm>
+          <a:prstGeom prst="straightConnector1">
+            <a:avLst/>
+          </a:prstGeom>
+          <a:ln>
+            <a:tailEnd type="triangle"/>
+          </a:ln>
+        </p:spPr>
+        <p:style>
+          <a:lnRef idx="1">
+            <a:schemeClr val="accent1"/>
+          </a:lnRef>
+          <a:fillRef idx="0">
+            <a:schemeClr val="accent1"/>
+          </a:fillRef>
+          <a:effectRef idx="0">
+            <a:schemeClr val="accent1"/>
+          </a:effectRef>
+          <a:fontRef idx="minor">
+            <a:schemeClr val="tx1"/>
+          </a:fontRef>
+        </p:style>
+      </p:cxnSp>
+      <p:cxnSp>
+        <p:nvCxnSpPr>
+          <p:cNvPr id="42" name="Conector recto de flecha 41">
+            <a:extLst>
+              <a:ext uri="{FF2B5EF4-FFF2-40B4-BE49-F238E27FC236}">
+                <a16:creationId xmlns:a16="http://schemas.microsoft.com/office/drawing/2014/main" id="{A094E413-560C-4441-9D5C-CEFB633AF874}"/>
+              </a:ext>
+            </a:extLst>
+          </p:cNvPr>
+          <p:cNvCxnSpPr>
+            <a:stCxn id="14" idx="3"/>
+            <a:endCxn id="15" idx="1"/>
+          </p:cNvCxnSpPr>
+          <p:nvPr/>
+        </p:nvCxnSpPr>
+        <p:spPr>
+          <a:xfrm flipV="1">
+            <a:off x="5554352" y="5502932"/>
+            <a:ext cx="864096" cy="4694"/>
+          </a:xfrm>
+          <a:prstGeom prst="straightConnector1">
+            <a:avLst/>
+          </a:prstGeom>
+          <a:ln>
+            <a:tailEnd type="triangle"/>
+          </a:ln>
+        </p:spPr>
+        <p:style>
+          <a:lnRef idx="1">
+            <a:schemeClr val="accent1"/>
+          </a:lnRef>
+          <a:fillRef idx="0">
+            <a:schemeClr val="accent1"/>
+          </a:fillRef>
+          <a:effectRef idx="0">
+            <a:schemeClr val="accent1"/>
+          </a:effectRef>
+          <a:fontRef idx="minor">
+            <a:schemeClr val="tx1"/>
+          </a:fontRef>
+        </p:style>
+      </p:cxnSp>
+      <p:cxnSp>
+        <p:nvCxnSpPr>
+          <p:cNvPr id="45" name="Conector recto de flecha 44">
+            <a:extLst>
+              <a:ext uri="{FF2B5EF4-FFF2-40B4-BE49-F238E27FC236}">
+                <a16:creationId xmlns:a16="http://schemas.microsoft.com/office/drawing/2014/main" id="{DB33671D-ADD1-464B-8F4C-0EE81BC36054}"/>
+              </a:ext>
+            </a:extLst>
+          </p:cNvPr>
+          <p:cNvCxnSpPr>
+            <a:stCxn id="16" idx="3"/>
+            <a:endCxn id="17" idx="1"/>
+          </p:cNvCxnSpPr>
+          <p:nvPr/>
+        </p:nvCxnSpPr>
+        <p:spPr>
+          <a:xfrm>
+            <a:off x="5572354" y="6230173"/>
+            <a:ext cx="846094" cy="0"/>
+          </a:xfrm>
+          <a:prstGeom prst="straightConnector1">
+            <a:avLst/>
+          </a:prstGeom>
+          <a:ln>
+            <a:tailEnd type="triangle"/>
+          </a:ln>
+        </p:spPr>
+        <p:style>
+          <a:lnRef idx="1">
+            <a:schemeClr val="accent1"/>
+          </a:lnRef>
+          <a:fillRef idx="0">
+            <a:schemeClr val="accent1"/>
+          </a:fillRef>
+          <a:effectRef idx="0">
+            <a:schemeClr val="accent1"/>
+          </a:effectRef>
+          <a:fontRef idx="minor">
+            <a:schemeClr val="tx1"/>
+          </a:fontRef>
+        </p:style>
+      </p:cxnSp>
+      <p:cxnSp>
+        <p:nvCxnSpPr>
+          <p:cNvPr id="47" name="Conector recto de flecha 46">
+            <a:extLst>
+              <a:ext uri="{FF2B5EF4-FFF2-40B4-BE49-F238E27FC236}">
+                <a16:creationId xmlns:a16="http://schemas.microsoft.com/office/drawing/2014/main" id="{EC003243-F9A4-4765-AA00-AC74D4A07086}"/>
+              </a:ext>
+            </a:extLst>
+          </p:cNvPr>
+          <p:cNvCxnSpPr>
+            <a:stCxn id="12" idx="3"/>
+            <a:endCxn id="13" idx="1"/>
+          </p:cNvCxnSpPr>
+          <p:nvPr/>
+        </p:nvCxnSpPr>
+        <p:spPr>
+          <a:xfrm>
+            <a:off x="8065160" y="4854860"/>
+            <a:ext cx="513528" cy="0"/>
+          </a:xfrm>
+          <a:prstGeom prst="straightConnector1">
+            <a:avLst/>
+          </a:prstGeom>
+          <a:ln>
+            <a:tailEnd type="triangle"/>
+          </a:ln>
+        </p:spPr>
+        <p:style>
+          <a:lnRef idx="1">
+            <a:schemeClr val="accent1"/>
+          </a:lnRef>
+          <a:fillRef idx="0">
+            <a:schemeClr val="accent1"/>
+          </a:fillRef>
+          <a:effectRef idx="0">
+            <a:schemeClr val="accent1"/>
+          </a:effectRef>
+          <a:fontRef idx="minor">
+            <a:schemeClr val="tx1"/>
+          </a:fontRef>
+        </p:style>
+      </p:cxnSp>
     </p:spTree>
     <p:extLst>
       <p:ext uri="{BB962C8B-B14F-4D97-AF65-F5344CB8AC3E}">
@@ -5453,6 +6818,240 @@
           <p:cNvPr id="2" name="Título 1">
             <a:extLst>
               <a:ext uri="{FF2B5EF4-FFF2-40B4-BE49-F238E27FC236}">
+                <a16:creationId xmlns:a16="http://schemas.microsoft.com/office/drawing/2014/main" id="{4E7D48D5-182B-4352-89AD-96EE5040F043}"/>
+              </a:ext>
+            </a:extLst>
+          </p:cNvPr>
+          <p:cNvSpPr>
+            <a:spLocks noGrp="1"/>
+          </p:cNvSpPr>
+          <p:nvPr>
+            <p:ph type="title"/>
+          </p:nvPr>
+        </p:nvSpPr>
+        <p:spPr/>
+        <p:txBody>
+          <a:bodyPr/>
+          <a:lstStyle/>
+          <a:p>
+            <a:r>
+              <a:rPr lang="es-PE" dirty="0" err="1"/>
+              <a:t>Finding</a:t>
+            </a:r>
+            <a:r>
+              <a:rPr lang="es-PE" dirty="0"/>
+              <a:t> </a:t>
+            </a:r>
+            <a:r>
+              <a:rPr lang="es-PE" dirty="0" err="1"/>
+              <a:t>the</a:t>
+            </a:r>
+            <a:r>
+              <a:rPr lang="es-PE" dirty="0"/>
+              <a:t> Centers</a:t>
+            </a:r>
+          </a:p>
+        </p:txBody>
+      </p:sp>
+      <p:pic>
+        <p:nvPicPr>
+          <p:cNvPr id="5" name="Marcador de contenido 4">
+            <a:extLst>
+              <a:ext uri="{FF2B5EF4-FFF2-40B4-BE49-F238E27FC236}">
+                <a16:creationId xmlns:a16="http://schemas.microsoft.com/office/drawing/2014/main" id="{5E470797-EC90-4A45-8E3A-1DA7AB977475}"/>
+              </a:ext>
+            </a:extLst>
+          </p:cNvPr>
+          <p:cNvPicPr>
+            <a:picLocks noGrp="1" noChangeAspect="1"/>
+          </p:cNvPicPr>
+          <p:nvPr>
+            <p:ph idx="1"/>
+          </p:nvPr>
+        </p:nvPicPr>
+        <p:blipFill>
+          <a:blip r:embed="rId2">
+            <a:extLst>
+              <a:ext uri="{28A0092B-C50C-407E-A947-70E740481C1C}">
+                <a14:useLocalDpi xmlns:a14="http://schemas.microsoft.com/office/drawing/2010/main" val="0"/>
+              </a:ext>
+            </a:extLst>
+          </a:blip>
+          <a:stretch>
+            <a:fillRect/>
+          </a:stretch>
+        </p:blipFill>
+        <p:spPr>
+          <a:xfrm>
+            <a:off x="1065212" y="2348880"/>
+            <a:ext cx="8501413" cy="3450820"/>
+          </a:xfrm>
+        </p:spPr>
+      </p:pic>
+    </p:spTree>
+    <p:extLst>
+      <p:ext uri="{BB962C8B-B14F-4D97-AF65-F5344CB8AC3E}">
+        <p14:creationId xmlns:p14="http://schemas.microsoft.com/office/powerpoint/2010/main" val="2327817826"/>
+      </p:ext>
+    </p:extLst>
+  </p:cSld>
+  <p:clrMapOvr>
+    <a:masterClrMapping/>
+  </p:clrMapOvr>
+  <mc:AlternateContent xmlns:mc="http://schemas.openxmlformats.org/markup-compatibility/2006" xmlns:p14="http://schemas.microsoft.com/office/powerpoint/2010/main">
+    <mc:Choice Requires="p14">
+      <p:transition spd="med" p14:dur="700">
+        <p:fade/>
+      </p:transition>
+    </mc:Choice>
+    <mc:Fallback xmlns="">
+      <p:transition spd="med">
+        <p:fade/>
+      </p:transition>
+    </mc:Fallback>
+  </mc:AlternateContent>
+</p:sld>
+</file>
+
+<file path=ppt/slides/slide6.xml><?xml version="1.0" encoding="utf-8"?>
+<p:sld xmlns:a="http://schemas.openxmlformats.org/drawingml/2006/main" xmlns:r="http://schemas.openxmlformats.org/officeDocument/2006/relationships" xmlns:p="http://schemas.openxmlformats.org/presentationml/2006/main">
+  <p:cSld>
+    <p:spTree>
+      <p:nvGrpSpPr>
+        <p:cNvPr id="1" name=""/>
+        <p:cNvGrpSpPr/>
+        <p:nvPr/>
+      </p:nvGrpSpPr>
+      <p:grpSpPr>
+        <a:xfrm>
+          <a:off x="0" y="0"/>
+          <a:ext cx="0" cy="0"/>
+          <a:chOff x="0" y="0"/>
+          <a:chExt cx="0" cy="0"/>
+        </a:xfrm>
+      </p:grpSpPr>
+      <p:sp>
+        <p:nvSpPr>
+          <p:cNvPr id="2" name="Título 1">
+            <a:extLst>
+              <a:ext uri="{FF2B5EF4-FFF2-40B4-BE49-F238E27FC236}">
+                <a16:creationId xmlns:a16="http://schemas.microsoft.com/office/drawing/2014/main" id="{A78FF307-244F-461C-AAEE-E59352F79111}"/>
+              </a:ext>
+            </a:extLst>
+          </p:cNvPr>
+          <p:cNvSpPr>
+            <a:spLocks noGrp="1"/>
+          </p:cNvSpPr>
+          <p:nvPr>
+            <p:ph type="title"/>
+          </p:nvPr>
+        </p:nvSpPr>
+        <p:spPr/>
+        <p:txBody>
+          <a:bodyPr/>
+          <a:lstStyle/>
+          <a:p>
+            <a:r>
+              <a:rPr lang="es-PE" dirty="0" err="1"/>
+              <a:t>Segregation</a:t>
+            </a:r>
+            <a:r>
+              <a:rPr lang="es-PE" dirty="0"/>
+              <a:t> </a:t>
+            </a:r>
+            <a:r>
+              <a:rPr lang="es-PE" dirty="0" err="1"/>
+              <a:t>the</a:t>
+            </a:r>
+            <a:r>
+              <a:rPr lang="es-PE" dirty="0"/>
+              <a:t> Centers</a:t>
+            </a:r>
+          </a:p>
+        </p:txBody>
+      </p:sp>
+      <p:pic>
+        <p:nvPicPr>
+          <p:cNvPr id="5" name="Marcador de contenido 4">
+            <a:extLst>
+              <a:ext uri="{FF2B5EF4-FFF2-40B4-BE49-F238E27FC236}">
+                <a16:creationId xmlns:a16="http://schemas.microsoft.com/office/drawing/2014/main" id="{8E5C5B7F-E4B4-418F-82ED-CA13166AC549}"/>
+              </a:ext>
+            </a:extLst>
+          </p:cNvPr>
+          <p:cNvPicPr>
+            <a:picLocks noGrp="1" noChangeAspect="1"/>
+          </p:cNvPicPr>
+          <p:nvPr>
+            <p:ph idx="1"/>
+          </p:nvPr>
+        </p:nvPicPr>
+        <p:blipFill>
+          <a:blip r:embed="rId2">
+            <a:extLst>
+              <a:ext uri="{28A0092B-C50C-407E-A947-70E740481C1C}">
+                <a14:useLocalDpi xmlns:a14="http://schemas.microsoft.com/office/drawing/2010/main" val="0"/>
+              </a:ext>
+            </a:extLst>
+          </a:blip>
+          <a:stretch>
+            <a:fillRect/>
+          </a:stretch>
+        </p:blipFill>
+        <p:spPr>
+          <a:xfrm>
+            <a:off x="1084338" y="2636912"/>
+            <a:ext cx="6082060" cy="1989983"/>
+          </a:xfrm>
+        </p:spPr>
+      </p:pic>
+    </p:spTree>
+    <p:extLst>
+      <p:ext uri="{BB962C8B-B14F-4D97-AF65-F5344CB8AC3E}">
+        <p14:creationId xmlns:p14="http://schemas.microsoft.com/office/powerpoint/2010/main" val="1886210624"/>
+      </p:ext>
+    </p:extLst>
+  </p:cSld>
+  <p:clrMapOvr>
+    <a:masterClrMapping/>
+  </p:clrMapOvr>
+  <mc:AlternateContent xmlns:mc="http://schemas.openxmlformats.org/markup-compatibility/2006" xmlns:p14="http://schemas.microsoft.com/office/powerpoint/2010/main">
+    <mc:Choice Requires="p14">
+      <p:transition spd="med" p14:dur="700">
+        <p:fade/>
+      </p:transition>
+    </mc:Choice>
+    <mc:Fallback xmlns="">
+      <p:transition spd="med">
+        <p:fade/>
+      </p:transition>
+    </mc:Fallback>
+  </mc:AlternateContent>
+</p:sld>
+</file>
+
+<file path=ppt/slides/slide7.xml><?xml version="1.0" encoding="utf-8"?>
+<p:sld xmlns:a="http://schemas.openxmlformats.org/drawingml/2006/main" xmlns:r="http://schemas.openxmlformats.org/officeDocument/2006/relationships" xmlns:p="http://schemas.openxmlformats.org/presentationml/2006/main">
+  <p:cSld>
+    <p:spTree>
+      <p:nvGrpSpPr>
+        <p:cNvPr id="1" name=""/>
+        <p:cNvGrpSpPr/>
+        <p:nvPr/>
+      </p:nvGrpSpPr>
+      <p:grpSpPr>
+        <a:xfrm>
+          <a:off x="0" y="0"/>
+          <a:ext cx="0" cy="0"/>
+          <a:chOff x="0" y="0"/>
+          <a:chExt cx="0" cy="0"/>
+        </a:xfrm>
+      </p:grpSpPr>
+      <p:sp>
+        <p:nvSpPr>
+          <p:cNvPr id="2" name="Título 1">
+            <a:extLst>
+              <a:ext uri="{FF2B5EF4-FFF2-40B4-BE49-F238E27FC236}">
                 <a16:creationId xmlns:a16="http://schemas.microsoft.com/office/drawing/2014/main" id="{A0914FC2-D698-4D0D-9F06-921C9B040D84}"/>
               </a:ext>
             </a:extLst>
@@ -5510,7 +7109,7 @@
 </p:sld>
 </file>
 
-<file path=ppt/slides/slide6.xml><?xml version="1.0" encoding="utf-8"?>
+<file path=ppt/slides/slide8.xml><?xml version="1.0" encoding="utf-8"?>
 <p:sld xmlns:a="http://schemas.openxmlformats.org/drawingml/2006/main" xmlns:r="http://schemas.openxmlformats.org/officeDocument/2006/relationships" xmlns:p="http://schemas.openxmlformats.org/presentationml/2006/main">
   <p:cSld>
     <p:spTree>
@@ -5620,7 +7219,7 @@
 </p:sld>
 </file>
 
-<file path=ppt/slides/slide7.xml><?xml version="1.0" encoding="utf-8"?>
+<file path=ppt/slides/slide9.xml><?xml version="1.0" encoding="utf-8"?>
 <p:sld xmlns:a="http://schemas.openxmlformats.org/drawingml/2006/main" xmlns:r="http://schemas.openxmlformats.org/officeDocument/2006/relationships" xmlns:p="http://schemas.openxmlformats.org/presentationml/2006/main">
   <p:cSld>
     <p:spTree>
@@ -5719,331 +7318,6 @@
     <p:extLst>
       <p:ext uri="{BB962C8B-B14F-4D97-AF65-F5344CB8AC3E}">
         <p14:creationId xmlns:p14="http://schemas.microsoft.com/office/powerpoint/2010/main" val="3713136148"/>
-      </p:ext>
-    </p:extLst>
-  </p:cSld>
-  <p:clrMapOvr>
-    <a:masterClrMapping/>
-  </p:clrMapOvr>
-  <mc:AlternateContent xmlns:mc="http://schemas.openxmlformats.org/markup-compatibility/2006" xmlns:p14="http://schemas.microsoft.com/office/powerpoint/2010/main">
-    <mc:Choice Requires="p14">
-      <p:transition spd="med" p14:dur="700">
-        <p:fade/>
-      </p:transition>
-    </mc:Choice>
-    <mc:Fallback xmlns="">
-      <p:transition spd="med">
-        <p:fade/>
-      </p:transition>
-    </mc:Fallback>
-  </mc:AlternateContent>
-</p:sld>
-</file>
-
-<file path=ppt/slides/slide8.xml><?xml version="1.0" encoding="utf-8"?>
-<p:sld xmlns:a="http://schemas.openxmlformats.org/drawingml/2006/main" xmlns:r="http://schemas.openxmlformats.org/officeDocument/2006/relationships" xmlns:p="http://schemas.openxmlformats.org/presentationml/2006/main">
-  <p:cSld>
-    <p:spTree>
-      <p:nvGrpSpPr>
-        <p:cNvPr id="1" name=""/>
-        <p:cNvGrpSpPr/>
-        <p:nvPr/>
-      </p:nvGrpSpPr>
-      <p:grpSpPr>
-        <a:xfrm>
-          <a:off x="0" y="0"/>
-          <a:ext cx="0" cy="0"/>
-          <a:chOff x="0" y="0"/>
-          <a:chExt cx="0" cy="0"/>
-        </a:xfrm>
-      </p:grpSpPr>
-      <p:sp>
-        <p:nvSpPr>
-          <p:cNvPr id="2" name="Título 1">
-            <a:extLst>
-              <a:ext uri="{FF2B5EF4-FFF2-40B4-BE49-F238E27FC236}">
-                <a16:creationId xmlns:a16="http://schemas.microsoft.com/office/drawing/2014/main" id="{C6CF3F5D-49D3-4A0E-BEAB-16B350D3303F}"/>
-              </a:ext>
-            </a:extLst>
-          </p:cNvPr>
-          <p:cNvSpPr>
-            <a:spLocks noGrp="1"/>
-          </p:cNvSpPr>
-          <p:nvPr>
-            <p:ph type="title"/>
-          </p:nvPr>
-        </p:nvSpPr>
-        <p:spPr>
-          <a:xfrm>
-            <a:off x="1751010" y="553871"/>
-            <a:ext cx="8686801" cy="1066800"/>
-          </a:xfrm>
-        </p:spPr>
-        <p:txBody>
-          <a:bodyPr/>
-          <a:lstStyle/>
-          <a:p>
-            <a:pPr algn="ctr"/>
-            <a:r>
-              <a:rPr lang="es-PE" dirty="0" err="1"/>
-              <a:t>Rings</a:t>
-            </a:r>
-            <a:r>
-              <a:rPr lang="es-PE" dirty="0"/>
-              <a:t> </a:t>
-            </a:r>
-            <a:r>
-              <a:rPr lang="es-PE" dirty="0" err="1"/>
-              <a:t>Pattern</a:t>
-            </a:r>
-            <a:r>
-              <a:rPr lang="es-PE" dirty="0"/>
-              <a:t> </a:t>
-            </a:r>
-            <a:r>
-              <a:rPr lang="es-PE" dirty="0" err="1"/>
-              <a:t>Detected</a:t>
-            </a:r>
-            <a:endParaRPr lang="es-PE" dirty="0"/>
-          </a:p>
-        </p:txBody>
-      </p:sp>
-      <p:pic>
-        <p:nvPicPr>
-          <p:cNvPr id="5" name="Marcador de contenido 4">
-            <a:extLst>
-              <a:ext uri="{FF2B5EF4-FFF2-40B4-BE49-F238E27FC236}">
-                <a16:creationId xmlns:a16="http://schemas.microsoft.com/office/drawing/2014/main" id="{0DAFF8C7-42E8-4BFE-88C4-2518A16D7138}"/>
-              </a:ext>
-            </a:extLst>
-          </p:cNvPr>
-          <p:cNvPicPr>
-            <a:picLocks noGrp="1" noChangeAspect="1"/>
-          </p:cNvPicPr>
-          <p:nvPr>
-            <p:ph idx="1"/>
-          </p:nvPr>
-        </p:nvPicPr>
-        <p:blipFill>
-          <a:blip r:embed="rId2">
-            <a:extLst>
-              <a:ext uri="{28A0092B-C50C-407E-A947-70E740481C1C}">
-                <a14:useLocalDpi xmlns:a14="http://schemas.microsoft.com/office/drawing/2010/main" val="0"/>
-              </a:ext>
-            </a:extLst>
-          </a:blip>
-          <a:stretch>
-            <a:fillRect/>
-          </a:stretch>
-        </p:blipFill>
-        <p:spPr>
-          <a:xfrm>
-            <a:off x="2000793" y="2113129"/>
-            <a:ext cx="8187237" cy="4191000"/>
-          </a:xfrm>
-        </p:spPr>
-      </p:pic>
-    </p:spTree>
-    <p:extLst>
-      <p:ext uri="{BB962C8B-B14F-4D97-AF65-F5344CB8AC3E}">
-        <p14:creationId xmlns:p14="http://schemas.microsoft.com/office/powerpoint/2010/main" val="2464730877"/>
-      </p:ext>
-    </p:extLst>
-  </p:cSld>
-  <p:clrMapOvr>
-    <a:masterClrMapping/>
-  </p:clrMapOvr>
-  <mc:AlternateContent xmlns:mc="http://schemas.openxmlformats.org/markup-compatibility/2006" xmlns:p14="http://schemas.microsoft.com/office/powerpoint/2010/main">
-    <mc:Choice Requires="p14">
-      <p:transition spd="med" p14:dur="700">
-        <p:fade/>
-      </p:transition>
-    </mc:Choice>
-    <mc:Fallback xmlns="">
-      <p:transition spd="med">
-        <p:fade/>
-      </p:transition>
-    </mc:Fallback>
-  </mc:AlternateContent>
-</p:sld>
-</file>
-
-<file path=ppt/slides/slide9.xml><?xml version="1.0" encoding="utf-8"?>
-<p:sld xmlns:a="http://schemas.openxmlformats.org/drawingml/2006/main" xmlns:r="http://schemas.openxmlformats.org/officeDocument/2006/relationships" xmlns:p="http://schemas.openxmlformats.org/presentationml/2006/main">
-  <p:cSld>
-    <p:spTree>
-      <p:nvGrpSpPr>
-        <p:cNvPr id="1" name=""/>
-        <p:cNvGrpSpPr/>
-        <p:nvPr/>
-      </p:nvGrpSpPr>
-      <p:grpSpPr>
-        <a:xfrm>
-          <a:off x="0" y="0"/>
-          <a:ext cx="0" cy="0"/>
-          <a:chOff x="0" y="0"/>
-          <a:chExt cx="0" cy="0"/>
-        </a:xfrm>
-      </p:grpSpPr>
-      <p:sp>
-        <p:nvSpPr>
-          <p:cNvPr id="2" name="Título 1">
-            <a:extLst>
-              <a:ext uri="{FF2B5EF4-FFF2-40B4-BE49-F238E27FC236}">
-                <a16:creationId xmlns:a16="http://schemas.microsoft.com/office/drawing/2014/main" id="{977BAAD3-B068-41DE-B19B-4718F8950B3B}"/>
-              </a:ext>
-            </a:extLst>
-          </p:cNvPr>
-          <p:cNvSpPr>
-            <a:spLocks noGrp="1"/>
-          </p:cNvSpPr>
-          <p:nvPr>
-            <p:ph type="title"/>
-          </p:nvPr>
-        </p:nvSpPr>
-        <p:spPr/>
-        <p:txBody>
-          <a:bodyPr/>
-          <a:lstStyle/>
-          <a:p>
-            <a:r>
-              <a:rPr lang="es-PE" dirty="0" err="1"/>
-              <a:t>Bibliography</a:t>
-            </a:r>
-            <a:endParaRPr lang="es-PE" dirty="0"/>
-          </a:p>
-        </p:txBody>
-      </p:sp>
-      <p:sp>
-        <p:nvSpPr>
-          <p:cNvPr id="3" name="Marcador de contenido 2">
-            <a:extLst>
-              <a:ext uri="{FF2B5EF4-FFF2-40B4-BE49-F238E27FC236}">
-                <a16:creationId xmlns:a16="http://schemas.microsoft.com/office/drawing/2014/main" id="{756C1DE9-3397-46DC-8DD4-ACF6A015E9E0}"/>
-              </a:ext>
-            </a:extLst>
-          </p:cNvPr>
-          <p:cNvSpPr>
-            <a:spLocks noGrp="1"/>
-          </p:cNvSpPr>
-          <p:nvPr>
-            <p:ph idx="1"/>
-          </p:nvPr>
-        </p:nvSpPr>
-        <p:spPr/>
-        <p:txBody>
-          <a:bodyPr/>
-          <a:lstStyle/>
-          <a:p>
-            <a:r>
-              <a:rPr lang="es-PE" dirty="0" err="1"/>
-              <a:t>Asthana</a:t>
-            </a:r>
-            <a:r>
-              <a:rPr lang="es-PE" dirty="0"/>
-              <a:t>, </a:t>
-            </a:r>
-            <a:r>
-              <a:rPr lang="es-PE" dirty="0" err="1"/>
-              <a:t>Shubham</a:t>
-            </a:r>
-            <a:r>
-              <a:rPr lang="es-PE" dirty="0"/>
-              <a:t>. (2014). </a:t>
-            </a:r>
-            <a:r>
-              <a:rPr lang="es-PE" dirty="0" err="1"/>
-              <a:t>Enhanced</a:t>
-            </a:r>
-            <a:r>
-              <a:rPr lang="es-PE" dirty="0"/>
-              <a:t> Camera </a:t>
-            </a:r>
-            <a:r>
-              <a:rPr lang="es-PE" dirty="0" err="1"/>
-              <a:t>Calibration</a:t>
-            </a:r>
-            <a:r>
-              <a:rPr lang="es-PE" dirty="0"/>
-              <a:t> </a:t>
-            </a:r>
-            <a:r>
-              <a:rPr lang="es-PE" dirty="0" err="1"/>
-              <a:t>for</a:t>
-            </a:r>
-            <a:r>
-              <a:rPr lang="es-PE" dirty="0"/>
-              <a:t> Machine </a:t>
-            </a:r>
-            <a:r>
-              <a:rPr lang="es-PE" dirty="0" err="1"/>
-              <a:t>Vision</a:t>
-            </a:r>
-            <a:r>
-              <a:rPr lang="es-PE" dirty="0"/>
-              <a:t> </a:t>
-            </a:r>
-            <a:r>
-              <a:rPr lang="es-PE" dirty="0" err="1"/>
-              <a:t>using</a:t>
-            </a:r>
-            <a:r>
-              <a:rPr lang="es-PE" dirty="0"/>
-              <a:t> </a:t>
-            </a:r>
-            <a:r>
-              <a:rPr lang="es-PE" dirty="0" err="1"/>
-              <a:t>OpenCV</a:t>
-            </a:r>
-            <a:r>
-              <a:rPr lang="es-PE" dirty="0"/>
-              <a:t>. International </a:t>
-            </a:r>
-            <a:r>
-              <a:rPr lang="es-PE" dirty="0" err="1"/>
-              <a:t>Journal</a:t>
-            </a:r>
-            <a:r>
-              <a:rPr lang="es-PE" dirty="0"/>
-              <a:t> </a:t>
-            </a:r>
-            <a:r>
-              <a:rPr lang="es-PE" dirty="0" err="1"/>
-              <a:t>of</a:t>
-            </a:r>
-            <a:r>
-              <a:rPr lang="es-PE" dirty="0"/>
-              <a:t> Artificial </a:t>
-            </a:r>
-            <a:r>
-              <a:rPr lang="es-PE" dirty="0" err="1"/>
-              <a:t>Intelligence</a:t>
-            </a:r>
-            <a:r>
-              <a:rPr lang="es-PE" dirty="0"/>
-              <a:t>. </a:t>
-            </a:r>
-            <a:r>
-              <a:rPr lang="es-PE" dirty="0" err="1"/>
-              <a:t>Volume</a:t>
-            </a:r>
-            <a:r>
-              <a:rPr lang="es-PE" dirty="0"/>
-              <a:t> 3. </a:t>
-            </a:r>
-          </a:p>
-          <a:p>
-            <a:r>
-              <a:rPr lang="es-PE" dirty="0"/>
-              <a:t>https://docs.opencv.org</a:t>
-            </a:r>
-          </a:p>
-        </p:txBody>
-      </p:sp>
-    </p:spTree>
-    <p:extLst>
-      <p:ext uri="{BB962C8B-B14F-4D97-AF65-F5344CB8AC3E}">
-        <p14:creationId xmlns:p14="http://schemas.microsoft.com/office/powerpoint/2010/main" val="4072475522"/>
       </p:ext>
     </p:extLst>
   </p:cSld>
@@ -6913,17 +8187,6 @@
 </file>
 
 <file path=customXml/item2.xml><?xml version="1.0" encoding="utf-8"?>
-<p:properties xmlns:p="http://schemas.microsoft.com/office/2006/metadata/properties" xmlns:xsi="http://www.w3.org/2001/XMLSchema-instance" xmlns:pc="http://schemas.microsoft.com/office/infopath/2007/PartnerControls">
-  <documentManagement>
-    <VSO_x0020_item_x0020_id xmlns="40262f94-9f35-4ac3-9a90-690165a166b7" xsi:nil="true"/>
-    <Assetid_x0020_ xmlns="40262f94-9f35-4ac3-9a90-690165a166b7" xsi:nil="true"/>
-    <Item_x0020_Details xmlns="40262f94-9f35-4ac3-9a90-690165a166b7" xsi:nil="true"/>
-    <Template_x0020_details xmlns="40262f94-9f35-4ac3-9a90-690165a166b7" xsi:nil="true"/>
-  </documentManagement>
-</p:properties>
-</file>
-
-<file path=customXml/item3.xml><?xml version="1.0" encoding="utf-8"?>
 <ct:contentTypeSchema xmlns:ct="http://schemas.microsoft.com/office/2006/metadata/contentType" xmlns:ma="http://schemas.microsoft.com/office/2006/metadata/properties/metaAttributes" ct:_="" ma:_="" ma:contentTypeName="Document" ma:contentTypeID="0x010100AA3F7D94069FF64A86F7DFF56D60E3BE" ma:contentTypeVersion="6" ma:contentTypeDescription="Create a new document." ma:contentTypeScope="" ma:versionID="c32302c77d4085ecf495bdddb7f5e889">
   <xsd:schema xmlns:xsd="http://www.w3.org/2001/XMLSchema" xmlns:xs="http://www.w3.org/2001/XMLSchema" xmlns:p="http://schemas.microsoft.com/office/2006/metadata/properties" xmlns:ns2="a4f35948-e619-41b3-aa29-22878b09cfd2" xmlns:ns3="40262f94-9f35-4ac3-9a90-690165a166b7" targetNamespace="http://schemas.microsoft.com/office/2006/metadata/properties" ma:root="true" ma:fieldsID="4ab5ae46be95f9d0be6107e8200be7a2" ns2:_="" ns3:_="">
     <xsd:import namespace="a4f35948-e619-41b3-aa29-22878b09cfd2"/>
@@ -7104,6 +8367,17 @@
 </ct:contentTypeSchema>
 </file>
 
+<file path=customXml/item3.xml><?xml version="1.0" encoding="utf-8"?>
+<p:properties xmlns:p="http://schemas.microsoft.com/office/2006/metadata/properties" xmlns:xsi="http://www.w3.org/2001/XMLSchema-instance" xmlns:pc="http://schemas.microsoft.com/office/infopath/2007/PartnerControls">
+  <documentManagement>
+    <VSO_x0020_item_x0020_id xmlns="40262f94-9f35-4ac3-9a90-690165a166b7" xsi:nil="true"/>
+    <Assetid_x0020_ xmlns="40262f94-9f35-4ac3-9a90-690165a166b7" xsi:nil="true"/>
+    <Item_x0020_Details xmlns="40262f94-9f35-4ac3-9a90-690165a166b7" xsi:nil="true"/>
+    <Template_x0020_details xmlns="40262f94-9f35-4ac3-9a90-690165a166b7" xsi:nil="true"/>
+  </documentManagement>
+</p:properties>
+</file>
+
 <file path=customXml/itemProps1.xml><?xml version="1.0" encoding="utf-8"?>
 <ds:datastoreItem xmlns:ds="http://schemas.openxmlformats.org/officeDocument/2006/customXml" ds:itemID="{653E1689-1E09-4ADC-A5E7-6718BF79A8A6}">
   <ds:schemaRefs>
@@ -7113,23 +8387,6 @@
 </file>
 
 <file path=customXml/itemProps2.xml><?xml version="1.0" encoding="utf-8"?>
-<ds:datastoreItem xmlns:ds="http://schemas.openxmlformats.org/officeDocument/2006/customXml" ds:itemID="{3FFF1070-8794-47AC-90B7-1F2E078096FF}">
-  <ds:schemaRefs>
-    <ds:schemaRef ds:uri="40262f94-9f35-4ac3-9a90-690165a166b7"/>
-    <ds:schemaRef ds:uri="http://purl.org/dc/dcmitype/"/>
-    <ds:schemaRef ds:uri="http://purl.org/dc/elements/1.1/"/>
-    <ds:schemaRef ds:uri="http://schemas.microsoft.com/office/2006/documentManagement/types"/>
-    <ds:schemaRef ds:uri="http://schemas.microsoft.com/office/infopath/2007/PartnerControls"/>
-    <ds:schemaRef ds:uri="http://schemas.microsoft.com/office/2006/metadata/properties"/>
-    <ds:schemaRef ds:uri="a4f35948-e619-41b3-aa29-22878b09cfd2"/>
-    <ds:schemaRef ds:uri="http://www.w3.org/XML/1998/namespace"/>
-    <ds:schemaRef ds:uri="http://schemas.openxmlformats.org/package/2006/metadata/core-properties"/>
-    <ds:schemaRef ds:uri="http://purl.org/dc/terms/"/>
-  </ds:schemaRefs>
-</ds:datastoreItem>
-</file>
-
-<file path=customXml/itemProps3.xml><?xml version="1.0" encoding="utf-8"?>
 <ds:datastoreItem xmlns:ds="http://schemas.openxmlformats.org/officeDocument/2006/customXml" ds:itemID="{7CB30B94-6D3B-4C91-947C-5EB8E8EFFE4F}">
   <ds:schemaRefs>
     <ds:schemaRef ds:uri="http://schemas.microsoft.com/office/2006/metadata/contentType"/>
@@ -7146,4 +8403,21 @@
     <ds:schemaRef ds:uri="http://schemas.microsoft.com/internal/obd"/>
   </ds:schemaRefs>
 </ds:datastoreItem>
+</file>
+
+<file path=customXml/itemProps3.xml><?xml version="1.0" encoding="utf-8"?>
+<ds:datastoreItem xmlns:ds="http://schemas.openxmlformats.org/officeDocument/2006/customXml" ds:itemID="{3FFF1070-8794-47AC-90B7-1F2E078096FF}">
+  <ds:schemaRefs>
+    <ds:schemaRef ds:uri="40262f94-9f35-4ac3-9a90-690165a166b7"/>
+    <ds:schemaRef ds:uri="http://purl.org/dc/dcmitype/"/>
+    <ds:schemaRef ds:uri="http://purl.org/dc/elements/1.1/"/>
+    <ds:schemaRef ds:uri="http://schemas.microsoft.com/office/2006/documentManagement/types"/>
+    <ds:schemaRef ds:uri="http://schemas.microsoft.com/office/infopath/2007/PartnerControls"/>
+    <ds:schemaRef ds:uri="http://schemas.microsoft.com/office/2006/metadata/properties"/>
+    <ds:schemaRef ds:uri="a4f35948-e619-41b3-aa29-22878b09cfd2"/>
+    <ds:schemaRef ds:uri="http://www.w3.org/XML/1998/namespace"/>
+    <ds:schemaRef ds:uri="http://schemas.openxmlformats.org/package/2006/metadata/core-properties"/>
+    <ds:schemaRef ds:uri="http://purl.org/dc/terms/"/>
+  </ds:schemaRefs>
+</ds:datastoreItem>
 </file>
</xml_diff>

<commit_message>
Added original pattern sample.
</commit_message>
<xml_diff>
--- a/PatternRecognition/PatternRecognition.pptx
+++ b/PatternRecognition/PatternRecognition.pptx
@@ -5,10 +5,10 @@
     <p:sldMasterId id="2147483660" r:id="rId4"/>
   </p:sldMasterIdLst>
   <p:notesMasterIdLst>
-    <p:notesMasterId r:id="rId18"/>
+    <p:notesMasterId r:id="rId19"/>
   </p:notesMasterIdLst>
   <p:handoutMasterIdLst>
-    <p:handoutMasterId r:id="rId19"/>
+    <p:handoutMasterId r:id="rId20"/>
   </p:handoutMasterIdLst>
   <p:sldIdLst>
     <p:sldId id="257" r:id="rId5"/>
@@ -22,8 +22,9 @@
     <p:sldId id="261" r:id="rId13"/>
     <p:sldId id="264" r:id="rId14"/>
     <p:sldId id="265" r:id="rId15"/>
-    <p:sldId id="267" r:id="rId16"/>
-    <p:sldId id="268" r:id="rId17"/>
+    <p:sldId id="272" r:id="rId16"/>
+    <p:sldId id="267" r:id="rId17"/>
+    <p:sldId id="268" r:id="rId18"/>
   </p:sldIdLst>
   <p:sldSz cx="12188825" cy="6858000"/>
   <p:notesSz cx="6858000" cy="9144000"/>
@@ -4933,6 +4934,155 @@
           <a:chExt cx="0" cy="0"/>
         </a:xfrm>
       </p:grpSpPr>
+      <p:pic>
+        <p:nvPicPr>
+          <p:cNvPr id="11" name="Marcador de contenido 10">
+            <a:extLst>
+              <a:ext uri="{FF2B5EF4-FFF2-40B4-BE49-F238E27FC236}">
+                <a16:creationId xmlns:a16="http://schemas.microsoft.com/office/drawing/2014/main" id="{8685256A-9170-45D1-A642-AD6C9D6FF2A9}"/>
+              </a:ext>
+            </a:extLst>
+          </p:cNvPr>
+          <p:cNvPicPr>
+            <a:picLocks noGrp="1" noChangeAspect="1"/>
+          </p:cNvPicPr>
+          <p:nvPr>
+            <p:ph idx="1"/>
+          </p:nvPr>
+        </p:nvPicPr>
+        <p:blipFill>
+          <a:blip r:embed="rId2" cstate="print">
+            <a:extLst>
+              <a:ext uri="{28A0092B-C50C-407E-A947-70E740481C1C}">
+                <a14:useLocalDpi xmlns:a14="http://schemas.microsoft.com/office/drawing/2010/main" val="0"/>
+              </a:ext>
+            </a:extLst>
+          </a:blip>
+          <a:stretch>
+            <a:fillRect/>
+          </a:stretch>
+        </p:blipFill>
+        <p:spPr>
+          <a:xfrm>
+            <a:off x="1413892" y="3140968"/>
+            <a:ext cx="3796327" cy="2590800"/>
+          </a:xfrm>
+        </p:spPr>
+      </p:pic>
+      <p:pic>
+        <p:nvPicPr>
+          <p:cNvPr id="15" name="Imagen 14">
+            <a:extLst>
+              <a:ext uri="{FF2B5EF4-FFF2-40B4-BE49-F238E27FC236}">
+                <a16:creationId xmlns:a16="http://schemas.microsoft.com/office/drawing/2014/main" id="{6A64D550-16D7-4D79-B593-303F76741041}"/>
+              </a:ext>
+            </a:extLst>
+          </p:cNvPr>
+          <p:cNvPicPr>
+            <a:picLocks noChangeAspect="1"/>
+          </p:cNvPicPr>
+          <p:nvPr/>
+        </p:nvPicPr>
+        <p:blipFill>
+          <a:blip r:embed="rId3">
+            <a:extLst>
+              <a:ext uri="{28A0092B-C50C-407E-A947-70E740481C1C}">
+                <a14:useLocalDpi xmlns:a14="http://schemas.microsoft.com/office/drawing/2010/main" val="0"/>
+              </a:ext>
+            </a:extLst>
+          </a:blip>
+          <a:stretch>
+            <a:fillRect/>
+          </a:stretch>
+        </p:blipFill>
+        <p:spPr>
+          <a:xfrm>
+            <a:off x="3862164" y="257268"/>
+            <a:ext cx="4170500" cy="2852384"/>
+          </a:xfrm>
+          <a:prstGeom prst="rect">
+            <a:avLst/>
+          </a:prstGeom>
+        </p:spPr>
+      </p:pic>
+      <p:pic>
+        <p:nvPicPr>
+          <p:cNvPr id="17" name="Imagen 16">
+            <a:extLst>
+              <a:ext uri="{FF2B5EF4-FFF2-40B4-BE49-F238E27FC236}">
+                <a16:creationId xmlns:a16="http://schemas.microsoft.com/office/drawing/2014/main" id="{C801ACA3-9AA5-4978-A659-FD06DA9E14EE}"/>
+              </a:ext>
+            </a:extLst>
+          </p:cNvPr>
+          <p:cNvPicPr>
+            <a:picLocks noChangeAspect="1"/>
+          </p:cNvPicPr>
+          <p:nvPr/>
+        </p:nvPicPr>
+        <p:blipFill>
+          <a:blip r:embed="rId4" cstate="print">
+            <a:extLst>
+              <a:ext uri="{28A0092B-C50C-407E-A947-70E740481C1C}">
+                <a14:useLocalDpi xmlns:a14="http://schemas.microsoft.com/office/drawing/2010/main" val="0"/>
+              </a:ext>
+            </a:extLst>
+          </a:blip>
+          <a:stretch>
+            <a:fillRect/>
+          </a:stretch>
+        </p:blipFill>
+        <p:spPr>
+          <a:xfrm>
+            <a:off x="6310436" y="3109652"/>
+            <a:ext cx="4170501" cy="2859967"/>
+          </a:xfrm>
+          <a:prstGeom prst="rect">
+            <a:avLst/>
+          </a:prstGeom>
+        </p:spPr>
+      </p:pic>
+    </p:spTree>
+    <p:extLst>
+      <p:ext uri="{BB962C8B-B14F-4D97-AF65-F5344CB8AC3E}">
+        <p14:creationId xmlns:p14="http://schemas.microsoft.com/office/powerpoint/2010/main" val="2135141684"/>
+      </p:ext>
+    </p:extLst>
+  </p:cSld>
+  <p:clrMapOvr>
+    <a:masterClrMapping/>
+  </p:clrMapOvr>
+  <mc:AlternateContent xmlns:mc="http://schemas.openxmlformats.org/markup-compatibility/2006" xmlns:p14="http://schemas.microsoft.com/office/powerpoint/2010/main">
+    <mc:Choice Requires="p14">
+      <p:transition spd="med" p14:dur="700">
+        <p:fade/>
+      </p:transition>
+    </mc:Choice>
+    <mc:Fallback xmlns="">
+      <p:transition spd="med">
+        <p:fade/>
+      </p:transition>
+    </mc:Fallback>
+  </mc:AlternateContent>
+</p:sld>
+</file>
+
+<file path=ppt/slides/slide13.xml><?xml version="1.0" encoding="utf-8"?>
+<p:sld xmlns:a="http://schemas.openxmlformats.org/drawingml/2006/main" xmlns:r="http://schemas.openxmlformats.org/officeDocument/2006/relationships" xmlns:p="http://schemas.openxmlformats.org/presentationml/2006/main">
+  <p:cSld>
+    <p:spTree>
+      <p:nvGrpSpPr>
+        <p:cNvPr id="1" name=""/>
+        <p:cNvGrpSpPr/>
+        <p:nvPr/>
+      </p:nvGrpSpPr>
+      <p:grpSpPr>
+        <a:xfrm>
+          <a:off x="0" y="0"/>
+          <a:ext cx="0" cy="0"/>
+          <a:chOff x="0" y="0"/>
+          <a:chExt cx="0" cy="0"/>
+        </a:xfrm>
+      </p:grpSpPr>
       <p:sp>
         <p:nvSpPr>
           <p:cNvPr id="2" name="Título 1">
@@ -5113,7 +5263,7 @@
 </p:sld>
 </file>
 
-<file path=ppt/slides/slide13.xml><?xml version="1.0" encoding="utf-8"?>
+<file path=ppt/slides/slide14.xml><?xml version="1.0" encoding="utf-8"?>
 <p:sld xmlns:a="http://schemas.openxmlformats.org/drawingml/2006/main" xmlns:r="http://schemas.openxmlformats.org/officeDocument/2006/relationships" xmlns:p="http://schemas.openxmlformats.org/presentationml/2006/main">
   <p:cSld>
     <p:spTree>
@@ -8305,6 +8455,17 @@
 </file>
 
 <file path=customXml/item2.xml><?xml version="1.0" encoding="utf-8"?>
+<p:properties xmlns:p="http://schemas.microsoft.com/office/2006/metadata/properties" xmlns:xsi="http://www.w3.org/2001/XMLSchema-instance" xmlns:pc="http://schemas.microsoft.com/office/infopath/2007/PartnerControls">
+  <documentManagement>
+    <VSO_x0020_item_x0020_id xmlns="40262f94-9f35-4ac3-9a90-690165a166b7" xsi:nil="true"/>
+    <Assetid_x0020_ xmlns="40262f94-9f35-4ac3-9a90-690165a166b7" xsi:nil="true"/>
+    <Item_x0020_Details xmlns="40262f94-9f35-4ac3-9a90-690165a166b7" xsi:nil="true"/>
+    <Template_x0020_details xmlns="40262f94-9f35-4ac3-9a90-690165a166b7" xsi:nil="true"/>
+  </documentManagement>
+</p:properties>
+</file>
+
+<file path=customXml/item3.xml><?xml version="1.0" encoding="utf-8"?>
 <ct:contentTypeSchema xmlns:ct="http://schemas.microsoft.com/office/2006/metadata/contentType" xmlns:ma="http://schemas.microsoft.com/office/2006/metadata/properties/metaAttributes" ct:_="" ma:_="" ma:contentTypeName="Document" ma:contentTypeID="0x010100AA3F7D94069FF64A86F7DFF56D60E3BE" ma:contentTypeVersion="6" ma:contentTypeDescription="Create a new document." ma:contentTypeScope="" ma:versionID="c32302c77d4085ecf495bdddb7f5e889">
   <xsd:schema xmlns:xsd="http://www.w3.org/2001/XMLSchema" xmlns:xs="http://www.w3.org/2001/XMLSchema" xmlns:p="http://schemas.microsoft.com/office/2006/metadata/properties" xmlns:ns2="a4f35948-e619-41b3-aa29-22878b09cfd2" xmlns:ns3="40262f94-9f35-4ac3-9a90-690165a166b7" targetNamespace="http://schemas.microsoft.com/office/2006/metadata/properties" ma:root="true" ma:fieldsID="4ab5ae46be95f9d0be6107e8200be7a2" ns2:_="" ns3:_="">
     <xsd:import namespace="a4f35948-e619-41b3-aa29-22878b09cfd2"/>
@@ -8485,17 +8646,6 @@
 </ct:contentTypeSchema>
 </file>
 
-<file path=customXml/item3.xml><?xml version="1.0" encoding="utf-8"?>
-<p:properties xmlns:p="http://schemas.microsoft.com/office/2006/metadata/properties" xmlns:xsi="http://www.w3.org/2001/XMLSchema-instance" xmlns:pc="http://schemas.microsoft.com/office/infopath/2007/PartnerControls">
-  <documentManagement>
-    <VSO_x0020_item_x0020_id xmlns="40262f94-9f35-4ac3-9a90-690165a166b7" xsi:nil="true"/>
-    <Assetid_x0020_ xmlns="40262f94-9f35-4ac3-9a90-690165a166b7" xsi:nil="true"/>
-    <Item_x0020_Details xmlns="40262f94-9f35-4ac3-9a90-690165a166b7" xsi:nil="true"/>
-    <Template_x0020_details xmlns="40262f94-9f35-4ac3-9a90-690165a166b7" xsi:nil="true"/>
-  </documentManagement>
-</p:properties>
-</file>
-
 <file path=customXml/itemProps1.xml><?xml version="1.0" encoding="utf-8"?>
 <ds:datastoreItem xmlns:ds="http://schemas.openxmlformats.org/officeDocument/2006/customXml" ds:itemID="{653E1689-1E09-4ADC-A5E7-6718BF79A8A6}">
   <ds:schemaRefs>
@@ -8505,6 +8655,23 @@
 </file>
 
 <file path=customXml/itemProps2.xml><?xml version="1.0" encoding="utf-8"?>
+<ds:datastoreItem xmlns:ds="http://schemas.openxmlformats.org/officeDocument/2006/customXml" ds:itemID="{3FFF1070-8794-47AC-90B7-1F2E078096FF}">
+  <ds:schemaRefs>
+    <ds:schemaRef ds:uri="40262f94-9f35-4ac3-9a90-690165a166b7"/>
+    <ds:schemaRef ds:uri="http://purl.org/dc/dcmitype/"/>
+    <ds:schemaRef ds:uri="http://purl.org/dc/elements/1.1/"/>
+    <ds:schemaRef ds:uri="http://schemas.microsoft.com/office/2006/documentManagement/types"/>
+    <ds:schemaRef ds:uri="http://schemas.microsoft.com/office/infopath/2007/PartnerControls"/>
+    <ds:schemaRef ds:uri="http://schemas.microsoft.com/office/2006/metadata/properties"/>
+    <ds:schemaRef ds:uri="a4f35948-e619-41b3-aa29-22878b09cfd2"/>
+    <ds:schemaRef ds:uri="http://www.w3.org/XML/1998/namespace"/>
+    <ds:schemaRef ds:uri="http://schemas.openxmlformats.org/package/2006/metadata/core-properties"/>
+    <ds:schemaRef ds:uri="http://purl.org/dc/terms/"/>
+  </ds:schemaRefs>
+</ds:datastoreItem>
+</file>
+
+<file path=customXml/itemProps3.xml><?xml version="1.0" encoding="utf-8"?>
 <ds:datastoreItem xmlns:ds="http://schemas.openxmlformats.org/officeDocument/2006/customXml" ds:itemID="{7CB30B94-6D3B-4C91-947C-5EB8E8EFFE4F}">
   <ds:schemaRefs>
     <ds:schemaRef ds:uri="http://schemas.microsoft.com/office/2006/metadata/contentType"/>
@@ -8521,21 +8688,4 @@
     <ds:schemaRef ds:uri="http://schemas.microsoft.com/internal/obd"/>
   </ds:schemaRefs>
 </ds:datastoreItem>
-</file>
-
-<file path=customXml/itemProps3.xml><?xml version="1.0" encoding="utf-8"?>
-<ds:datastoreItem xmlns:ds="http://schemas.openxmlformats.org/officeDocument/2006/customXml" ds:itemID="{3FFF1070-8794-47AC-90B7-1F2E078096FF}">
-  <ds:schemaRefs>
-    <ds:schemaRef ds:uri="40262f94-9f35-4ac3-9a90-690165a166b7"/>
-    <ds:schemaRef ds:uri="http://purl.org/dc/dcmitype/"/>
-    <ds:schemaRef ds:uri="http://purl.org/dc/elements/1.1/"/>
-    <ds:schemaRef ds:uri="http://schemas.microsoft.com/office/2006/documentManagement/types"/>
-    <ds:schemaRef ds:uri="http://schemas.microsoft.com/office/infopath/2007/PartnerControls"/>
-    <ds:schemaRef ds:uri="http://schemas.microsoft.com/office/2006/metadata/properties"/>
-    <ds:schemaRef ds:uri="a4f35948-e619-41b3-aa29-22878b09cfd2"/>
-    <ds:schemaRef ds:uri="http://www.w3.org/XML/1998/namespace"/>
-    <ds:schemaRef ds:uri="http://schemas.openxmlformats.org/package/2006/metadata/core-properties"/>
-    <ds:schemaRef ds:uri="http://purl.org/dc/terms/"/>
-  </ds:schemaRefs>
-</ds:datastoreItem>
 </file>
</xml_diff>